<commit_message>
Correction to EMU 1
</commit_message>
<xml_diff>
--- a/ConvolutionAnimation.pptx
+++ b/ConvolutionAnimation.pptx
@@ -113,6 +113,11 @@
       </a:defRPr>
     </a:lvl9pPr>
   </p:defaultTextStyle>
+  <p:extLst>
+    <p:ext uri="{EFAFB233-063F-42B5-8137-9DF3F51BA10A}">
+      <p15:sldGuideLst xmlns:p15="http://schemas.microsoft.com/office/powerpoint/2012/main"/>
+    </p:ext>
+  </p:extLst>
 </p:presentation>
 </file>
 
@@ -198,7 +203,7 @@
           <a:p>
             <a:fld id="{109A8376-1FCF-FB4D-842D-805C941E1D3D}" type="datetimeFigureOut">
               <a:rPr lang="en-US" smtClean="0"/>
-              <a:t>11/13/17</a:t>
+              <a:t>7/16/21</a:t>
             </a:fld>
             <a:endParaRPr lang="en-US"/>
           </a:p>
@@ -262,38 +267,37 @@
           <a:p>
             <a:pPr lvl="0"/>
             <a:r>
-              <a:rPr lang="en-US" smtClean="0"/>
+              <a:rPr lang="en-US"/>
               <a:t>Click to edit Master text styles</a:t>
             </a:r>
           </a:p>
           <a:p>
             <a:pPr lvl="1"/>
             <a:r>
-              <a:rPr lang="en-US" smtClean="0"/>
+              <a:rPr lang="en-US"/>
               <a:t>Second level</a:t>
             </a:r>
           </a:p>
           <a:p>
             <a:pPr lvl="2"/>
             <a:r>
-              <a:rPr lang="en-US" smtClean="0"/>
+              <a:rPr lang="en-US"/>
               <a:t>Third level</a:t>
             </a:r>
           </a:p>
           <a:p>
             <a:pPr lvl="3"/>
             <a:r>
-              <a:rPr lang="en-US" smtClean="0"/>
+              <a:rPr lang="en-US"/>
               <a:t>Fourth level</a:t>
             </a:r>
           </a:p>
           <a:p>
             <a:pPr lvl="4"/>
             <a:r>
-              <a:rPr lang="en-US" smtClean="0"/>
+              <a:rPr lang="en-US"/>
               <a:t>Fifth level</a:t>
             </a:r>
-            <a:endParaRPr lang="en-US"/>
           </a:p>
         </p:txBody>
       </p:sp>
@@ -508,10 +512,9 @@
           </a:lstStyle>
           <a:p>
             <a:r>
-              <a:rPr lang="en-US" smtClean="0"/>
+              <a:rPr lang="en-US"/>
               <a:t>Click to edit Master title style</a:t>
             </a:r>
-            <a:endParaRPr lang="en-US"/>
           </a:p>
         </p:txBody>
       </p:sp>
@@ -573,10 +576,9 @@
           </a:lstStyle>
           <a:p>
             <a:r>
-              <a:rPr lang="en-US" smtClean="0"/>
+              <a:rPr lang="en-US"/>
               <a:t>Click to edit Master subtitle style</a:t>
             </a:r>
-            <a:endParaRPr lang="en-US"/>
           </a:p>
         </p:txBody>
       </p:sp>
@@ -597,7 +599,7 @@
           <a:p>
             <a:fld id="{300122B5-F302-7B40-9802-0AC80F810D25}" type="datetimeFigureOut">
               <a:rPr lang="en-US" smtClean="0"/>
-              <a:t>11/13/17</a:t>
+              <a:t>7/16/21</a:t>
             </a:fld>
             <a:endParaRPr lang="en-US"/>
           </a:p>
@@ -691,10 +693,9 @@
           <a:lstStyle/>
           <a:p>
             <a:r>
-              <a:rPr lang="en-US" smtClean="0"/>
+              <a:rPr lang="en-US"/>
               <a:t>Click to edit Master title style</a:t>
             </a:r>
-            <a:endParaRPr lang="en-US"/>
           </a:p>
         </p:txBody>
       </p:sp>
@@ -715,38 +716,37 @@
           <a:p>
             <a:pPr lvl="0"/>
             <a:r>
-              <a:rPr lang="en-US" smtClean="0"/>
+              <a:rPr lang="en-US"/>
               <a:t>Click to edit Master text styles</a:t>
             </a:r>
           </a:p>
           <a:p>
             <a:pPr lvl="1"/>
             <a:r>
-              <a:rPr lang="en-US" smtClean="0"/>
+              <a:rPr lang="en-US"/>
               <a:t>Second level</a:t>
             </a:r>
           </a:p>
           <a:p>
             <a:pPr lvl="2"/>
             <a:r>
-              <a:rPr lang="en-US" smtClean="0"/>
+              <a:rPr lang="en-US"/>
               <a:t>Third level</a:t>
             </a:r>
           </a:p>
           <a:p>
             <a:pPr lvl="3"/>
             <a:r>
-              <a:rPr lang="en-US" smtClean="0"/>
+              <a:rPr lang="en-US"/>
               <a:t>Fourth level</a:t>
             </a:r>
           </a:p>
           <a:p>
             <a:pPr lvl="4"/>
             <a:r>
-              <a:rPr lang="en-US" smtClean="0"/>
+              <a:rPr lang="en-US"/>
               <a:t>Fifth level</a:t>
             </a:r>
-            <a:endParaRPr lang="en-US"/>
           </a:p>
         </p:txBody>
       </p:sp>
@@ -767,7 +767,7 @@
           <a:p>
             <a:fld id="{300122B5-F302-7B40-9802-0AC80F810D25}" type="datetimeFigureOut">
               <a:rPr lang="en-US" smtClean="0"/>
-              <a:t>11/13/17</a:t>
+              <a:t>7/16/21</a:t>
             </a:fld>
             <a:endParaRPr lang="en-US"/>
           </a:p>
@@ -866,10 +866,9 @@
           <a:lstStyle/>
           <a:p>
             <a:r>
-              <a:rPr lang="en-US" smtClean="0"/>
+              <a:rPr lang="en-US"/>
               <a:t>Click to edit Master title style</a:t>
             </a:r>
-            <a:endParaRPr lang="en-US"/>
           </a:p>
         </p:txBody>
       </p:sp>
@@ -895,38 +894,37 @@
           <a:p>
             <a:pPr lvl="0"/>
             <a:r>
-              <a:rPr lang="en-US" smtClean="0"/>
+              <a:rPr lang="en-US"/>
               <a:t>Click to edit Master text styles</a:t>
             </a:r>
           </a:p>
           <a:p>
             <a:pPr lvl="1"/>
             <a:r>
-              <a:rPr lang="en-US" smtClean="0"/>
+              <a:rPr lang="en-US"/>
               <a:t>Second level</a:t>
             </a:r>
           </a:p>
           <a:p>
             <a:pPr lvl="2"/>
             <a:r>
-              <a:rPr lang="en-US" smtClean="0"/>
+              <a:rPr lang="en-US"/>
               <a:t>Third level</a:t>
             </a:r>
           </a:p>
           <a:p>
             <a:pPr lvl="3"/>
             <a:r>
-              <a:rPr lang="en-US" smtClean="0"/>
+              <a:rPr lang="en-US"/>
               <a:t>Fourth level</a:t>
             </a:r>
           </a:p>
           <a:p>
             <a:pPr lvl="4"/>
             <a:r>
-              <a:rPr lang="en-US" smtClean="0"/>
+              <a:rPr lang="en-US"/>
               <a:t>Fifth level</a:t>
             </a:r>
-            <a:endParaRPr lang="en-US"/>
           </a:p>
         </p:txBody>
       </p:sp>
@@ -947,7 +945,7 @@
           <a:p>
             <a:fld id="{300122B5-F302-7B40-9802-0AC80F810D25}" type="datetimeFigureOut">
               <a:rPr lang="en-US" smtClean="0"/>
-              <a:t>11/13/17</a:t>
+              <a:t>7/16/21</a:t>
             </a:fld>
             <a:endParaRPr lang="en-US"/>
           </a:p>
@@ -1041,10 +1039,9 @@
           <a:lstStyle/>
           <a:p>
             <a:r>
-              <a:rPr lang="en-US" smtClean="0"/>
+              <a:rPr lang="en-US"/>
               <a:t>Click to edit Master title style</a:t>
             </a:r>
-            <a:endParaRPr lang="en-US"/>
           </a:p>
         </p:txBody>
       </p:sp>
@@ -1065,38 +1062,37 @@
           <a:p>
             <a:pPr lvl="0"/>
             <a:r>
-              <a:rPr lang="en-US" smtClean="0"/>
+              <a:rPr lang="en-US"/>
               <a:t>Click to edit Master text styles</a:t>
             </a:r>
           </a:p>
           <a:p>
             <a:pPr lvl="1"/>
             <a:r>
-              <a:rPr lang="en-US" smtClean="0"/>
+              <a:rPr lang="en-US"/>
               <a:t>Second level</a:t>
             </a:r>
           </a:p>
           <a:p>
             <a:pPr lvl="2"/>
             <a:r>
-              <a:rPr lang="en-US" smtClean="0"/>
+              <a:rPr lang="en-US"/>
               <a:t>Third level</a:t>
             </a:r>
           </a:p>
           <a:p>
             <a:pPr lvl="3"/>
             <a:r>
-              <a:rPr lang="en-US" smtClean="0"/>
+              <a:rPr lang="en-US"/>
               <a:t>Fourth level</a:t>
             </a:r>
           </a:p>
           <a:p>
             <a:pPr lvl="4"/>
             <a:r>
-              <a:rPr lang="en-US" smtClean="0"/>
+              <a:rPr lang="en-US"/>
               <a:t>Fifth level</a:t>
             </a:r>
-            <a:endParaRPr lang="en-US"/>
           </a:p>
         </p:txBody>
       </p:sp>
@@ -1117,7 +1113,7 @@
           <a:p>
             <a:fld id="{300122B5-F302-7B40-9802-0AC80F810D25}" type="datetimeFigureOut">
               <a:rPr lang="en-US" smtClean="0"/>
-              <a:t>11/13/17</a:t>
+              <a:t>7/16/21</a:t>
             </a:fld>
             <a:endParaRPr lang="en-US"/>
           </a:p>
@@ -1220,10 +1216,9 @@
           </a:lstStyle>
           <a:p>
             <a:r>
-              <a:rPr lang="en-US" smtClean="0"/>
+              <a:rPr lang="en-US"/>
               <a:t>Click to edit Master title style</a:t>
             </a:r>
-            <a:endParaRPr lang="en-US"/>
           </a:p>
         </p:txBody>
       </p:sp>
@@ -1340,7 +1335,7 @@
           <a:p>
             <a:pPr lvl="0"/>
             <a:r>
-              <a:rPr lang="en-US" smtClean="0"/>
+              <a:rPr lang="en-US"/>
               <a:t>Click to edit Master text styles</a:t>
             </a:r>
           </a:p>
@@ -1363,7 +1358,7 @@
           <a:p>
             <a:fld id="{300122B5-F302-7B40-9802-0AC80F810D25}" type="datetimeFigureOut">
               <a:rPr lang="en-US" smtClean="0"/>
-              <a:t>11/13/17</a:t>
+              <a:t>7/16/21</a:t>
             </a:fld>
             <a:endParaRPr lang="en-US"/>
           </a:p>
@@ -1457,10 +1452,9 @@
           <a:lstStyle/>
           <a:p>
             <a:r>
-              <a:rPr lang="en-US" smtClean="0"/>
+              <a:rPr lang="en-US"/>
               <a:t>Click to edit Master title style</a:t>
             </a:r>
-            <a:endParaRPr lang="en-US"/>
           </a:p>
         </p:txBody>
       </p:sp>
@@ -1486,38 +1480,37 @@
           <a:p>
             <a:pPr lvl="0"/>
             <a:r>
-              <a:rPr lang="en-US" smtClean="0"/>
+              <a:rPr lang="en-US"/>
               <a:t>Click to edit Master text styles</a:t>
             </a:r>
           </a:p>
           <a:p>
             <a:pPr lvl="1"/>
             <a:r>
-              <a:rPr lang="en-US" smtClean="0"/>
+              <a:rPr lang="en-US"/>
               <a:t>Second level</a:t>
             </a:r>
           </a:p>
           <a:p>
             <a:pPr lvl="2"/>
             <a:r>
-              <a:rPr lang="en-US" smtClean="0"/>
+              <a:rPr lang="en-US"/>
               <a:t>Third level</a:t>
             </a:r>
           </a:p>
           <a:p>
             <a:pPr lvl="3"/>
             <a:r>
-              <a:rPr lang="en-US" smtClean="0"/>
+              <a:rPr lang="en-US"/>
               <a:t>Fourth level</a:t>
             </a:r>
           </a:p>
           <a:p>
             <a:pPr lvl="4"/>
             <a:r>
-              <a:rPr lang="en-US" smtClean="0"/>
+              <a:rPr lang="en-US"/>
               <a:t>Fifth level</a:t>
             </a:r>
-            <a:endParaRPr lang="en-US"/>
           </a:p>
         </p:txBody>
       </p:sp>
@@ -1543,38 +1536,37 @@
           <a:p>
             <a:pPr lvl="0"/>
             <a:r>
-              <a:rPr lang="en-US" smtClean="0"/>
+              <a:rPr lang="en-US"/>
               <a:t>Click to edit Master text styles</a:t>
             </a:r>
           </a:p>
           <a:p>
             <a:pPr lvl="1"/>
             <a:r>
-              <a:rPr lang="en-US" smtClean="0"/>
+              <a:rPr lang="en-US"/>
               <a:t>Second level</a:t>
             </a:r>
           </a:p>
           <a:p>
             <a:pPr lvl="2"/>
             <a:r>
-              <a:rPr lang="en-US" smtClean="0"/>
+              <a:rPr lang="en-US"/>
               <a:t>Third level</a:t>
             </a:r>
           </a:p>
           <a:p>
             <a:pPr lvl="3"/>
             <a:r>
-              <a:rPr lang="en-US" smtClean="0"/>
+              <a:rPr lang="en-US"/>
               <a:t>Fourth level</a:t>
             </a:r>
           </a:p>
           <a:p>
             <a:pPr lvl="4"/>
             <a:r>
-              <a:rPr lang="en-US" smtClean="0"/>
+              <a:rPr lang="en-US"/>
               <a:t>Fifth level</a:t>
             </a:r>
-            <a:endParaRPr lang="en-US"/>
           </a:p>
         </p:txBody>
       </p:sp>
@@ -1595,7 +1587,7 @@
           <a:p>
             <a:fld id="{300122B5-F302-7B40-9802-0AC80F810D25}" type="datetimeFigureOut">
               <a:rPr lang="en-US" smtClean="0"/>
-              <a:t>11/13/17</a:t>
+              <a:t>7/16/21</a:t>
             </a:fld>
             <a:endParaRPr lang="en-US"/>
           </a:p>
@@ -1694,10 +1686,9 @@
           <a:lstStyle/>
           <a:p>
             <a:r>
-              <a:rPr lang="en-US" smtClean="0"/>
+              <a:rPr lang="en-US"/>
               <a:t>Click to edit Master title style</a:t>
             </a:r>
-            <a:endParaRPr lang="en-US"/>
           </a:p>
         </p:txBody>
       </p:sp>
@@ -1760,7 +1751,7 @@
           <a:p>
             <a:pPr lvl="0"/>
             <a:r>
-              <a:rPr lang="en-US" smtClean="0"/>
+              <a:rPr lang="en-US"/>
               <a:t>Click to edit Master text styles</a:t>
             </a:r>
           </a:p>
@@ -1788,38 +1779,37 @@
           <a:p>
             <a:pPr lvl="0"/>
             <a:r>
-              <a:rPr lang="en-US" smtClean="0"/>
+              <a:rPr lang="en-US"/>
               <a:t>Click to edit Master text styles</a:t>
             </a:r>
           </a:p>
           <a:p>
             <a:pPr lvl="1"/>
             <a:r>
-              <a:rPr lang="en-US" smtClean="0"/>
+              <a:rPr lang="en-US"/>
               <a:t>Second level</a:t>
             </a:r>
           </a:p>
           <a:p>
             <a:pPr lvl="2"/>
             <a:r>
-              <a:rPr lang="en-US" smtClean="0"/>
+              <a:rPr lang="en-US"/>
               <a:t>Third level</a:t>
             </a:r>
           </a:p>
           <a:p>
             <a:pPr lvl="3"/>
             <a:r>
-              <a:rPr lang="en-US" smtClean="0"/>
+              <a:rPr lang="en-US"/>
               <a:t>Fourth level</a:t>
             </a:r>
           </a:p>
           <a:p>
             <a:pPr lvl="4"/>
             <a:r>
-              <a:rPr lang="en-US" smtClean="0"/>
+              <a:rPr lang="en-US"/>
               <a:t>Fifth level</a:t>
             </a:r>
-            <a:endParaRPr lang="en-US"/>
           </a:p>
         </p:txBody>
       </p:sp>
@@ -1882,7 +1872,7 @@
           <a:p>
             <a:pPr lvl="0"/>
             <a:r>
-              <a:rPr lang="en-US" smtClean="0"/>
+              <a:rPr lang="en-US"/>
               <a:t>Click to edit Master text styles</a:t>
             </a:r>
           </a:p>
@@ -1910,38 +1900,37 @@
           <a:p>
             <a:pPr lvl="0"/>
             <a:r>
-              <a:rPr lang="en-US" smtClean="0"/>
+              <a:rPr lang="en-US"/>
               <a:t>Click to edit Master text styles</a:t>
             </a:r>
           </a:p>
           <a:p>
             <a:pPr lvl="1"/>
             <a:r>
-              <a:rPr lang="en-US" smtClean="0"/>
+              <a:rPr lang="en-US"/>
               <a:t>Second level</a:t>
             </a:r>
           </a:p>
           <a:p>
             <a:pPr lvl="2"/>
             <a:r>
-              <a:rPr lang="en-US" smtClean="0"/>
+              <a:rPr lang="en-US"/>
               <a:t>Third level</a:t>
             </a:r>
           </a:p>
           <a:p>
             <a:pPr lvl="3"/>
             <a:r>
-              <a:rPr lang="en-US" smtClean="0"/>
+              <a:rPr lang="en-US"/>
               <a:t>Fourth level</a:t>
             </a:r>
           </a:p>
           <a:p>
             <a:pPr lvl="4"/>
             <a:r>
-              <a:rPr lang="en-US" smtClean="0"/>
+              <a:rPr lang="en-US"/>
               <a:t>Fifth level</a:t>
             </a:r>
-            <a:endParaRPr lang="en-US"/>
           </a:p>
         </p:txBody>
       </p:sp>
@@ -1962,7 +1951,7 @@
           <a:p>
             <a:fld id="{300122B5-F302-7B40-9802-0AC80F810D25}" type="datetimeFigureOut">
               <a:rPr lang="en-US" smtClean="0"/>
-              <a:t>11/13/17</a:t>
+              <a:t>7/16/21</a:t>
             </a:fld>
             <a:endParaRPr lang="en-US"/>
           </a:p>
@@ -2056,10 +2045,9 @@
           <a:lstStyle/>
           <a:p>
             <a:r>
-              <a:rPr lang="en-US" smtClean="0"/>
+              <a:rPr lang="en-US"/>
               <a:t>Click to edit Master title style</a:t>
             </a:r>
-            <a:endParaRPr lang="en-US"/>
           </a:p>
         </p:txBody>
       </p:sp>
@@ -2080,7 +2068,7 @@
           <a:p>
             <a:fld id="{300122B5-F302-7B40-9802-0AC80F810D25}" type="datetimeFigureOut">
               <a:rPr lang="en-US" smtClean="0"/>
-              <a:t>11/13/17</a:t>
+              <a:t>7/16/21</a:t>
             </a:fld>
             <a:endParaRPr lang="en-US"/>
           </a:p>
@@ -2175,7 +2163,7 @@
           <a:p>
             <a:fld id="{300122B5-F302-7B40-9802-0AC80F810D25}" type="datetimeFigureOut">
               <a:rPr lang="en-US" smtClean="0"/>
-              <a:t>11/13/17</a:t>
+              <a:t>7/16/21</a:t>
             </a:fld>
             <a:endParaRPr lang="en-US"/>
           </a:p>
@@ -2278,10 +2266,9 @@
           </a:lstStyle>
           <a:p>
             <a:r>
-              <a:rPr lang="en-US" smtClean="0"/>
+              <a:rPr lang="en-US"/>
               <a:t>Click to edit Master title style</a:t>
             </a:r>
-            <a:endParaRPr lang="en-US"/>
           </a:p>
         </p:txBody>
       </p:sp>
@@ -2335,38 +2322,37 @@
           <a:p>
             <a:pPr lvl="0"/>
             <a:r>
-              <a:rPr lang="en-US" smtClean="0"/>
+              <a:rPr lang="en-US"/>
               <a:t>Click to edit Master text styles</a:t>
             </a:r>
           </a:p>
           <a:p>
             <a:pPr lvl="1"/>
             <a:r>
-              <a:rPr lang="en-US" smtClean="0"/>
+              <a:rPr lang="en-US"/>
               <a:t>Second level</a:t>
             </a:r>
           </a:p>
           <a:p>
             <a:pPr lvl="2"/>
             <a:r>
-              <a:rPr lang="en-US" smtClean="0"/>
+              <a:rPr lang="en-US"/>
               <a:t>Third level</a:t>
             </a:r>
           </a:p>
           <a:p>
             <a:pPr lvl="3"/>
             <a:r>
-              <a:rPr lang="en-US" smtClean="0"/>
+              <a:rPr lang="en-US"/>
               <a:t>Fourth level</a:t>
             </a:r>
           </a:p>
           <a:p>
             <a:pPr lvl="4"/>
             <a:r>
-              <a:rPr lang="en-US" smtClean="0"/>
+              <a:rPr lang="en-US"/>
               <a:t>Fifth level</a:t>
             </a:r>
-            <a:endParaRPr lang="en-US"/>
           </a:p>
         </p:txBody>
       </p:sp>
@@ -2429,7 +2415,7 @@
           <a:p>
             <a:pPr lvl="0"/>
             <a:r>
-              <a:rPr lang="en-US" smtClean="0"/>
+              <a:rPr lang="en-US"/>
               <a:t>Click to edit Master text styles</a:t>
             </a:r>
           </a:p>
@@ -2452,7 +2438,7 @@
           <a:p>
             <a:fld id="{300122B5-F302-7B40-9802-0AC80F810D25}" type="datetimeFigureOut">
               <a:rPr lang="en-US" smtClean="0"/>
-              <a:t>11/13/17</a:t>
+              <a:t>7/16/21</a:t>
             </a:fld>
             <a:endParaRPr lang="en-US"/>
           </a:p>
@@ -2555,10 +2541,9 @@
           </a:lstStyle>
           <a:p>
             <a:r>
-              <a:rPr lang="en-US" smtClean="0"/>
+              <a:rPr lang="en-US"/>
               <a:t>Click to edit Master title style</a:t>
             </a:r>
-            <a:endParaRPr lang="en-US"/>
           </a:p>
         </p:txBody>
       </p:sp>
@@ -2682,7 +2667,7 @@
           <a:p>
             <a:pPr lvl="0"/>
             <a:r>
-              <a:rPr lang="en-US" smtClean="0"/>
+              <a:rPr lang="en-US"/>
               <a:t>Click to edit Master text styles</a:t>
             </a:r>
           </a:p>
@@ -2705,7 +2690,7 @@
           <a:p>
             <a:fld id="{300122B5-F302-7B40-9802-0AC80F810D25}" type="datetimeFigureOut">
               <a:rPr lang="en-US" smtClean="0"/>
-              <a:t>11/13/17</a:t>
+              <a:t>7/16/21</a:t>
             </a:fld>
             <a:endParaRPr lang="en-US"/>
           </a:p>
@@ -2814,10 +2799,9 @@
           <a:lstStyle/>
           <a:p>
             <a:r>
-              <a:rPr lang="en-US" smtClean="0"/>
+              <a:rPr lang="en-US"/>
               <a:t>Click to edit Master title style</a:t>
             </a:r>
-            <a:endParaRPr lang="en-US"/>
           </a:p>
         </p:txBody>
       </p:sp>
@@ -2848,38 +2832,37 @@
           <a:p>
             <a:pPr lvl="0"/>
             <a:r>
-              <a:rPr lang="en-US" smtClean="0"/>
+              <a:rPr lang="en-US"/>
               <a:t>Click to edit Master text styles</a:t>
             </a:r>
           </a:p>
           <a:p>
             <a:pPr lvl="1"/>
             <a:r>
-              <a:rPr lang="en-US" smtClean="0"/>
+              <a:rPr lang="en-US"/>
               <a:t>Second level</a:t>
             </a:r>
           </a:p>
           <a:p>
             <a:pPr lvl="2"/>
             <a:r>
-              <a:rPr lang="en-US" smtClean="0"/>
+              <a:rPr lang="en-US"/>
               <a:t>Third level</a:t>
             </a:r>
           </a:p>
           <a:p>
             <a:pPr lvl="3"/>
             <a:r>
-              <a:rPr lang="en-US" smtClean="0"/>
+              <a:rPr lang="en-US"/>
               <a:t>Fourth level</a:t>
             </a:r>
           </a:p>
           <a:p>
             <a:pPr lvl="4"/>
             <a:r>
-              <a:rPr lang="en-US" smtClean="0"/>
+              <a:rPr lang="en-US"/>
               <a:t>Fifth level</a:t>
             </a:r>
-            <a:endParaRPr lang="en-US"/>
           </a:p>
         </p:txBody>
       </p:sp>
@@ -2918,7 +2901,7 @@
           <a:p>
             <a:fld id="{300122B5-F302-7B40-9802-0AC80F810D25}" type="datetimeFigureOut">
               <a:rPr lang="en-US" smtClean="0"/>
-              <a:t>11/13/17</a:t>
+              <a:t>7/16/21</a:t>
             </a:fld>
             <a:endParaRPr lang="en-US"/>
           </a:p>
@@ -3394,18 +3377,13 @@
               <a:p>
                 <a:pPr algn="ctr"/>
                 <a:r>
-                  <a:rPr lang="en-US" b="1" dirty="0" smtClean="0">
+                  <a:rPr lang="en-US" b="1" dirty="0">
                     <a:solidFill>
                       <a:schemeClr val="tx1"/>
                     </a:solidFill>
                   </a:rPr>
                   <a:t>1</a:t>
                 </a:r>
-                <a:endParaRPr lang="en-US" b="1" dirty="0">
-                  <a:solidFill>
-                    <a:schemeClr val="tx1"/>
-                  </a:solidFill>
-                </a:endParaRPr>
               </a:p>
             </p:txBody>
           </p:sp>
@@ -3452,18 +3430,13 @@
               <a:p>
                 <a:pPr algn="ctr"/>
                 <a:r>
-                  <a:rPr lang="en-US" b="1" dirty="0" smtClean="0">
+                  <a:rPr lang="en-US" b="1" dirty="0">
                     <a:solidFill>
                       <a:schemeClr val="tx1"/>
                     </a:solidFill>
                   </a:rPr>
                   <a:t>0</a:t>
                 </a:r>
-                <a:endParaRPr lang="en-US" b="1" dirty="0">
-                  <a:solidFill>
-                    <a:schemeClr val="tx1"/>
-                  </a:solidFill>
-                </a:endParaRPr>
               </a:p>
             </p:txBody>
           </p:sp>
@@ -3492,10 +3465,9 @@
             <a:p>
               <a:pPr algn="ctr"/>
               <a:r>
-                <a:rPr lang="en-US" sz="2400" dirty="0" smtClean="0"/>
+                <a:rPr lang="en-US" sz="2400" dirty="0"/>
                 <a:t>M+0</a:t>
               </a:r>
-              <a:endParaRPr lang="en-US" sz="2400" dirty="0"/>
             </a:p>
           </p:txBody>
         </p:sp>
@@ -3523,10 +3495,9 @@
             <a:p>
               <a:pPr algn="ctr"/>
               <a:r>
-                <a:rPr lang="en-US" sz="2400" dirty="0" smtClean="0"/>
+                <a:rPr lang="en-US" sz="2400" dirty="0"/>
                 <a:t>M+1</a:t>
               </a:r>
-              <a:endParaRPr lang="en-US" sz="2400" dirty="0"/>
             </a:p>
           </p:txBody>
         </p:sp>
@@ -3557,7 +3528,7 @@
                 <a:t>B</a:t>
               </a:r>
               <a:r>
-                <a:rPr lang="en-US" sz="3200" baseline="-25000" dirty="0" smtClean="0"/>
+                <a:rPr lang="en-US" sz="3200" baseline="-25000" dirty="0"/>
                 <a:t>1</a:t>
               </a:r>
               <a:endParaRPr lang="en-US" sz="3200" dirty="0"/>
@@ -3650,18 +3621,13 @@
                 <a:p>
                   <a:pPr algn="ctr"/>
                   <a:r>
-                    <a:rPr lang="en-US" b="1" dirty="0" smtClean="0">
+                    <a:rPr lang="en-US" b="1" dirty="0">
                       <a:solidFill>
                         <a:schemeClr val="tx1"/>
                       </a:solidFill>
                     </a:rPr>
                     <a:t>0</a:t>
                   </a:r>
-                  <a:endParaRPr lang="en-US" b="1" dirty="0">
-                    <a:solidFill>
-                      <a:schemeClr val="tx1"/>
-                    </a:solidFill>
-                  </a:endParaRPr>
                 </a:p>
               </p:txBody>
             </p:sp>
@@ -3708,18 +3674,13 @@
                 <a:p>
                   <a:pPr algn="ctr"/>
                   <a:r>
-                    <a:rPr lang="en-US" b="1" dirty="0" smtClean="0">
+                    <a:rPr lang="en-US" b="1" dirty="0">
                       <a:solidFill>
                         <a:schemeClr val="tx1"/>
                       </a:solidFill>
                     </a:rPr>
                     <a:t>0.5</a:t>
                   </a:r>
-                  <a:endParaRPr lang="en-US" b="1" dirty="0">
-                    <a:solidFill>
-                      <a:schemeClr val="tx1"/>
-                    </a:solidFill>
-                  </a:endParaRPr>
                 </a:p>
               </p:txBody>
             </p:sp>
@@ -3766,18 +3727,13 @@
                 <a:p>
                   <a:pPr algn="ctr"/>
                   <a:r>
-                    <a:rPr lang="en-US" b="1" dirty="0" smtClean="0">
+                    <a:rPr lang="en-US" b="1" dirty="0">
                       <a:solidFill>
                         <a:schemeClr val="tx1"/>
                       </a:solidFill>
                     </a:rPr>
                     <a:t>0.5</a:t>
                   </a:r>
-                  <a:endParaRPr lang="en-US" b="1" dirty="0">
-                    <a:solidFill>
-                      <a:schemeClr val="tx1"/>
-                    </a:solidFill>
-                  </a:endParaRPr>
                 </a:p>
               </p:txBody>
             </p:sp>
@@ -3806,10 +3762,9 @@
               <a:p>
                 <a:pPr algn="ctr"/>
                 <a:r>
-                  <a:rPr lang="en-US" sz="2400" dirty="0" smtClean="0"/>
+                  <a:rPr lang="en-US" sz="2400" dirty="0"/>
                   <a:t>M+0</a:t>
                 </a:r>
-                <a:endParaRPr lang="en-US" sz="2400" dirty="0"/>
               </a:p>
             </p:txBody>
           </p:sp>
@@ -3837,10 +3792,9 @@
               <a:p>
                 <a:pPr algn="ctr"/>
                 <a:r>
-                  <a:rPr lang="en-US" sz="2400" dirty="0" smtClean="0"/>
+                  <a:rPr lang="en-US" sz="2400" dirty="0"/>
                   <a:t>M+1</a:t>
                 </a:r>
-                <a:endParaRPr lang="en-US" sz="2400" dirty="0"/>
               </a:p>
             </p:txBody>
           </p:sp>
@@ -3868,10 +3822,9 @@
               <a:p>
                 <a:pPr algn="ctr"/>
                 <a:r>
-                  <a:rPr lang="en-US" sz="2400" dirty="0" smtClean="0"/>
+                  <a:rPr lang="en-US" sz="2400" dirty="0"/>
                   <a:t>M+2</a:t>
                 </a:r>
-                <a:endParaRPr lang="en-US" sz="2400" dirty="0"/>
               </a:p>
             </p:txBody>
           </p:sp>
@@ -3899,11 +3852,11 @@
             <a:lstStyle/>
             <a:p>
               <a:r>
-                <a:rPr lang="en-US" sz="3200" dirty="0" smtClean="0"/>
+                <a:rPr lang="en-US" sz="3200" dirty="0"/>
                 <a:t>A</a:t>
               </a:r>
               <a:r>
-                <a:rPr lang="en-US" sz="3200" baseline="-25000" dirty="0" smtClean="0"/>
+                <a:rPr lang="en-US" sz="3200" baseline="-25000" dirty="0"/>
                 <a:t>1,2</a:t>
               </a:r>
               <a:endParaRPr lang="en-US" sz="3200" dirty="0"/>
@@ -3935,10 +3888,9 @@
           <a:p>
             <a:pPr algn="ctr"/>
             <a:r>
-              <a:rPr lang="en-US" sz="4800" dirty="0" smtClean="0"/>
+              <a:rPr lang="en-US" sz="4800" dirty="0"/>
               <a:t>x</a:t>
             </a:r>
-            <a:endParaRPr lang="en-US" sz="4800" dirty="0"/>
           </a:p>
         </p:txBody>
       </p:sp>
@@ -3966,10 +3918,9 @@
           <a:p>
             <a:pPr algn="ctr"/>
             <a:r>
-              <a:rPr lang="en-US" sz="4800" dirty="0" smtClean="0"/>
+              <a:rPr lang="en-US" sz="4800" dirty="0"/>
               <a:t>=</a:t>
             </a:r>
-            <a:endParaRPr lang="en-US" sz="4800" dirty="0"/>
           </a:p>
         </p:txBody>
       </p:sp>
@@ -4051,11 +4002,6 @@
                   </a:rPr>
                   <a:t>?</a:t>
                 </a:r>
-                <a:endParaRPr lang="en-US" dirty="0">
-                  <a:solidFill>
-                    <a:schemeClr val="tx1"/>
-                  </a:solidFill>
-                </a:endParaRPr>
               </a:p>
             </p:txBody>
           </p:sp>
@@ -4102,18 +4048,13 @@
               <a:p>
                 <a:pPr algn="ctr"/>
                 <a:r>
-                  <a:rPr lang="en-US" dirty="0" smtClean="0">
+                  <a:rPr lang="en-US" dirty="0">
                     <a:solidFill>
                       <a:schemeClr val="tx1"/>
                     </a:solidFill>
                   </a:rPr>
                   <a:t>?</a:t>
                 </a:r>
-                <a:endParaRPr lang="en-US" dirty="0">
-                  <a:solidFill>
-                    <a:schemeClr val="tx1"/>
-                  </a:solidFill>
-                </a:endParaRPr>
               </a:p>
             </p:txBody>
           </p:sp>
@@ -4160,18 +4101,13 @@
               <a:p>
                 <a:pPr algn="ctr"/>
                 <a:r>
-                  <a:rPr lang="en-US" dirty="0" smtClean="0">
+                  <a:rPr lang="en-US" dirty="0">
                     <a:solidFill>
                       <a:schemeClr val="tx1"/>
                     </a:solidFill>
                   </a:rPr>
                   <a:t>?</a:t>
                 </a:r>
-                <a:endParaRPr lang="en-US" dirty="0">
-                  <a:solidFill>
-                    <a:schemeClr val="tx1"/>
-                  </a:solidFill>
-                </a:endParaRPr>
               </a:p>
             </p:txBody>
           </p:sp>
@@ -4200,10 +4136,9 @@
             <a:p>
               <a:pPr algn="ctr"/>
               <a:r>
-                <a:rPr lang="en-US" sz="2400" dirty="0" smtClean="0"/>
+                <a:rPr lang="en-US" sz="2400" dirty="0"/>
                 <a:t>M+0</a:t>
               </a:r>
-              <a:endParaRPr lang="en-US" sz="2400" dirty="0"/>
             </a:p>
           </p:txBody>
         </p:sp>
@@ -4231,10 +4166,9 @@
             <a:p>
               <a:pPr algn="ctr"/>
               <a:r>
-                <a:rPr lang="en-US" sz="2400" dirty="0" smtClean="0"/>
+                <a:rPr lang="en-US" sz="2400" dirty="0"/>
                 <a:t>M+1</a:t>
               </a:r>
-              <a:endParaRPr lang="en-US" sz="2400" dirty="0"/>
             </a:p>
           </p:txBody>
         </p:sp>
@@ -4262,7 +4196,7 @@
             <a:p>
               <a:pPr algn="ctr"/>
               <a:r>
-                <a:rPr lang="en-US" sz="2400" smtClean="0"/>
+                <a:rPr lang="en-US" sz="2400"/>
                 <a:t>M+2</a:t>
               </a:r>
               <a:endParaRPr lang="en-US" sz="2400" dirty="0"/>
@@ -4312,18 +4246,13 @@
             <a:p>
               <a:pPr algn="ctr"/>
               <a:r>
-                <a:rPr lang="en-US" dirty="0" smtClean="0">
+                <a:rPr lang="en-US" dirty="0">
                   <a:solidFill>
                     <a:schemeClr val="tx1"/>
                   </a:solidFill>
                 </a:rPr>
                 <a:t>?</a:t>
               </a:r>
-              <a:endParaRPr lang="en-US" dirty="0">
-                <a:solidFill>
-                  <a:schemeClr val="tx1"/>
-                </a:solidFill>
-              </a:endParaRPr>
             </a:p>
           </p:txBody>
         </p:sp>
@@ -4350,11 +4279,11 @@
             <a:lstStyle/>
             <a:p>
               <a:r>
-                <a:rPr lang="en-US" sz="3200" dirty="0" smtClean="0"/>
+                <a:rPr lang="en-US" sz="3200" dirty="0"/>
                 <a:t>C</a:t>
               </a:r>
               <a:r>
-                <a:rPr lang="en-US" sz="3200" baseline="-25000" dirty="0" smtClean="0"/>
+                <a:rPr lang="en-US" sz="3200" baseline="-25000" dirty="0"/>
                 <a:t>1,2,3</a:t>
               </a:r>
               <a:endParaRPr lang="en-US" sz="3200" dirty="0"/>
@@ -4385,7 +4314,7 @@
             <a:p>
               <a:pPr algn="ctr"/>
               <a:r>
-                <a:rPr lang="en-US" sz="2400" smtClean="0"/>
+                <a:rPr lang="en-US" sz="2400"/>
                 <a:t>M+3</a:t>
               </a:r>
               <a:endParaRPr lang="en-US" sz="2400" dirty="0"/>
@@ -4403,13 +4332,6 @@
   <p:clrMapOvr>
     <a:masterClrMapping/>
   </p:clrMapOvr>
-  <p:timing>
-    <p:tnLst>
-      <p:par>
-        <p:cTn id="1" dur="indefinite" restart="never" nodeType="tmRoot"/>
-      </p:par>
-    </p:tnLst>
-  </p:timing>
 </p:sld>
 </file>
 
@@ -4501,18 +4423,13 @@
               <a:p>
                 <a:pPr algn="ctr"/>
                 <a:r>
-                  <a:rPr lang="en-US" b="1" dirty="0" smtClean="0">
+                  <a:rPr lang="en-US" b="1" dirty="0">
                     <a:solidFill>
                       <a:schemeClr val="tx1"/>
                     </a:solidFill>
                   </a:rPr>
                   <a:t>0</a:t>
                 </a:r>
-                <a:endParaRPr lang="en-US" b="1" dirty="0">
-                  <a:solidFill>
-                    <a:schemeClr val="tx1"/>
-                  </a:solidFill>
-                </a:endParaRPr>
               </a:p>
             </p:txBody>
           </p:sp>
@@ -4559,18 +4476,13 @@
               <a:p>
                 <a:pPr algn="ctr"/>
                 <a:r>
-                  <a:rPr lang="en-US" b="1" dirty="0" smtClean="0">
+                  <a:rPr lang="en-US" b="1" dirty="0">
                     <a:solidFill>
                       <a:schemeClr val="tx1"/>
                     </a:solidFill>
                   </a:rPr>
                   <a:t>1</a:t>
                 </a:r>
-                <a:endParaRPr lang="en-US" b="1" dirty="0">
-                  <a:solidFill>
-                    <a:schemeClr val="tx1"/>
-                  </a:solidFill>
-                </a:endParaRPr>
               </a:p>
             </p:txBody>
           </p:sp>
@@ -4599,10 +4511,9 @@
             <a:p>
               <a:pPr algn="ctr"/>
               <a:r>
-                <a:rPr lang="en-US" sz="2400" dirty="0" smtClean="0"/>
+                <a:rPr lang="en-US" sz="2400" dirty="0"/>
                 <a:t>M+0</a:t>
               </a:r>
-              <a:endParaRPr lang="en-US" sz="2400" dirty="0"/>
             </a:p>
           </p:txBody>
         </p:sp>
@@ -4630,10 +4541,9 @@
             <a:p>
               <a:pPr algn="ctr"/>
               <a:r>
-                <a:rPr lang="en-US" sz="2400" dirty="0" smtClean="0"/>
+                <a:rPr lang="en-US" sz="2400" dirty="0"/>
                 <a:t>M+1</a:t>
               </a:r>
-              <a:endParaRPr lang="en-US" sz="2400" dirty="0"/>
             </a:p>
           </p:txBody>
         </p:sp>
@@ -4664,7 +4574,7 @@
                 <a:t>B</a:t>
               </a:r>
               <a:r>
-                <a:rPr lang="en-US" sz="3200" baseline="-25000" dirty="0" smtClean="0"/>
+                <a:rPr lang="en-US" sz="3200" baseline="-25000" dirty="0"/>
                 <a:t>1</a:t>
               </a:r>
               <a:endParaRPr lang="en-US" sz="3200" dirty="0"/>
@@ -4757,18 +4667,13 @@
                 <a:p>
                   <a:pPr algn="ctr"/>
                   <a:r>
-                    <a:rPr lang="en-US" b="1" dirty="0" smtClean="0">
+                    <a:rPr lang="en-US" b="1" dirty="0">
                       <a:solidFill>
                         <a:schemeClr val="tx1"/>
                       </a:solidFill>
                     </a:rPr>
                     <a:t>0</a:t>
                   </a:r>
-                  <a:endParaRPr lang="en-US" b="1" dirty="0">
-                    <a:solidFill>
-                      <a:schemeClr val="tx1"/>
-                    </a:solidFill>
-                  </a:endParaRPr>
                 </a:p>
               </p:txBody>
             </p:sp>
@@ -4815,18 +4720,13 @@
                 <a:p>
                   <a:pPr algn="ctr"/>
                   <a:r>
-                    <a:rPr lang="en-US" b="1" dirty="0" smtClean="0">
+                    <a:rPr lang="en-US" b="1" dirty="0">
                       <a:solidFill>
                         <a:schemeClr val="tx1"/>
                       </a:solidFill>
                     </a:rPr>
                     <a:t>0.5</a:t>
                   </a:r>
-                  <a:endParaRPr lang="en-US" b="1" dirty="0">
-                    <a:solidFill>
-                      <a:schemeClr val="tx1"/>
-                    </a:solidFill>
-                  </a:endParaRPr>
                 </a:p>
               </p:txBody>
             </p:sp>
@@ -4873,18 +4773,13 @@
                 <a:p>
                   <a:pPr algn="ctr"/>
                   <a:r>
-                    <a:rPr lang="en-US" b="1" dirty="0" smtClean="0">
+                    <a:rPr lang="en-US" b="1" dirty="0">
                       <a:solidFill>
                         <a:schemeClr val="tx1"/>
                       </a:solidFill>
                     </a:rPr>
                     <a:t>0.5</a:t>
                   </a:r>
-                  <a:endParaRPr lang="en-US" b="1" dirty="0">
-                    <a:solidFill>
-                      <a:schemeClr val="tx1"/>
-                    </a:solidFill>
-                  </a:endParaRPr>
                 </a:p>
               </p:txBody>
             </p:sp>
@@ -4913,10 +4808,9 @@
               <a:p>
                 <a:pPr algn="ctr"/>
                 <a:r>
-                  <a:rPr lang="en-US" sz="2400" dirty="0" smtClean="0"/>
+                  <a:rPr lang="en-US" sz="2400" dirty="0"/>
                   <a:t>M+0</a:t>
                 </a:r>
-                <a:endParaRPr lang="en-US" sz="2400" dirty="0"/>
               </a:p>
             </p:txBody>
           </p:sp>
@@ -4944,10 +4838,9 @@
               <a:p>
                 <a:pPr algn="ctr"/>
                 <a:r>
-                  <a:rPr lang="en-US" sz="2400" dirty="0" smtClean="0"/>
+                  <a:rPr lang="en-US" sz="2400" dirty="0"/>
                   <a:t>M+1</a:t>
                 </a:r>
-                <a:endParaRPr lang="en-US" sz="2400" dirty="0"/>
               </a:p>
             </p:txBody>
           </p:sp>
@@ -4975,10 +4868,9 @@
               <a:p>
                 <a:pPr algn="ctr"/>
                 <a:r>
-                  <a:rPr lang="en-US" sz="2400" dirty="0" smtClean="0"/>
+                  <a:rPr lang="en-US" sz="2400" dirty="0"/>
                   <a:t>M+2</a:t>
                 </a:r>
-                <a:endParaRPr lang="en-US" sz="2400" dirty="0"/>
               </a:p>
             </p:txBody>
           </p:sp>
@@ -5006,11 +4898,11 @@
             <a:lstStyle/>
             <a:p>
               <a:r>
-                <a:rPr lang="en-US" sz="3200" dirty="0" smtClean="0"/>
+                <a:rPr lang="en-US" sz="3200" dirty="0"/>
                 <a:t>A</a:t>
               </a:r>
               <a:r>
-                <a:rPr lang="en-US" sz="3200" baseline="-25000" dirty="0" smtClean="0"/>
+                <a:rPr lang="en-US" sz="3200" baseline="-25000" dirty="0"/>
                 <a:t>1,2</a:t>
               </a:r>
               <a:endParaRPr lang="en-US" sz="3200" dirty="0"/>
@@ -5042,10 +4934,9 @@
           <a:p>
             <a:pPr algn="ctr"/>
             <a:r>
-              <a:rPr lang="en-US" sz="4800" dirty="0" smtClean="0"/>
+              <a:rPr lang="en-US" sz="4800" dirty="0"/>
               <a:t>x</a:t>
             </a:r>
-            <a:endParaRPr lang="en-US" sz="4800" dirty="0"/>
           </a:p>
         </p:txBody>
       </p:sp>
@@ -5073,10 +4964,9 @@
           <a:p>
             <a:pPr algn="ctr"/>
             <a:r>
-              <a:rPr lang="en-US" sz="4800" dirty="0" smtClean="0"/>
+              <a:rPr lang="en-US" sz="4800" dirty="0"/>
               <a:t>=</a:t>
             </a:r>
-            <a:endParaRPr lang="en-US" sz="4800" dirty="0"/>
           </a:p>
         </p:txBody>
       </p:sp>
@@ -5158,11 +5048,6 @@
                   </a:rPr>
                   <a:t>?</a:t>
                 </a:r>
-                <a:endParaRPr lang="en-US" dirty="0">
-                  <a:solidFill>
-                    <a:schemeClr val="tx1"/>
-                  </a:solidFill>
-                </a:endParaRPr>
               </a:p>
             </p:txBody>
           </p:sp>
@@ -5209,18 +5094,13 @@
               <a:p>
                 <a:pPr algn="ctr"/>
                 <a:r>
-                  <a:rPr lang="en-US" dirty="0" smtClean="0">
+                  <a:rPr lang="en-US" dirty="0">
                     <a:solidFill>
                       <a:schemeClr val="tx1"/>
                     </a:solidFill>
                   </a:rPr>
                   <a:t>?</a:t>
                 </a:r>
-                <a:endParaRPr lang="en-US" dirty="0">
-                  <a:solidFill>
-                    <a:schemeClr val="tx1"/>
-                  </a:solidFill>
-                </a:endParaRPr>
               </a:p>
             </p:txBody>
           </p:sp>
@@ -5267,18 +5147,13 @@
               <a:p>
                 <a:pPr algn="ctr"/>
                 <a:r>
-                  <a:rPr lang="en-US" dirty="0" smtClean="0">
+                  <a:rPr lang="en-US" dirty="0">
                     <a:solidFill>
                       <a:schemeClr val="tx1"/>
                     </a:solidFill>
                   </a:rPr>
                   <a:t>?</a:t>
                 </a:r>
-                <a:endParaRPr lang="en-US" dirty="0">
-                  <a:solidFill>
-                    <a:schemeClr val="tx1"/>
-                  </a:solidFill>
-                </a:endParaRPr>
               </a:p>
             </p:txBody>
           </p:sp>
@@ -5307,10 +5182,9 @@
             <a:p>
               <a:pPr algn="ctr"/>
               <a:r>
-                <a:rPr lang="en-US" sz="2400" dirty="0" smtClean="0"/>
+                <a:rPr lang="en-US" sz="2400" dirty="0"/>
                 <a:t>M+0</a:t>
               </a:r>
-              <a:endParaRPr lang="en-US" sz="2400" dirty="0"/>
             </a:p>
           </p:txBody>
         </p:sp>
@@ -5338,10 +5212,9 @@
             <a:p>
               <a:pPr algn="ctr"/>
               <a:r>
-                <a:rPr lang="en-US" sz="2400" dirty="0" smtClean="0"/>
+                <a:rPr lang="en-US" sz="2400" dirty="0"/>
                 <a:t>M+1</a:t>
               </a:r>
-              <a:endParaRPr lang="en-US" sz="2400" dirty="0"/>
             </a:p>
           </p:txBody>
         </p:sp>
@@ -5369,7 +5242,7 @@
             <a:p>
               <a:pPr algn="ctr"/>
               <a:r>
-                <a:rPr lang="en-US" sz="2400" smtClean="0"/>
+                <a:rPr lang="en-US" sz="2400"/>
                 <a:t>M+2</a:t>
               </a:r>
               <a:endParaRPr lang="en-US" sz="2400" dirty="0"/>
@@ -5419,18 +5292,13 @@
             <a:p>
               <a:pPr algn="ctr"/>
               <a:r>
-                <a:rPr lang="en-US" dirty="0" smtClean="0">
+                <a:rPr lang="en-US" dirty="0">
                   <a:solidFill>
                     <a:schemeClr val="tx1"/>
                   </a:solidFill>
                 </a:rPr>
                 <a:t>?</a:t>
               </a:r>
-              <a:endParaRPr lang="en-US" dirty="0">
-                <a:solidFill>
-                  <a:schemeClr val="tx1"/>
-                </a:solidFill>
-              </a:endParaRPr>
             </a:p>
           </p:txBody>
         </p:sp>
@@ -5457,11 +5325,11 @@
             <a:lstStyle/>
             <a:p>
               <a:r>
-                <a:rPr lang="en-US" sz="3200" dirty="0" smtClean="0"/>
+                <a:rPr lang="en-US" sz="3200" dirty="0"/>
                 <a:t>C</a:t>
               </a:r>
               <a:r>
-                <a:rPr lang="en-US" sz="3200" baseline="-25000" dirty="0" smtClean="0"/>
+                <a:rPr lang="en-US" sz="3200" baseline="-25000" dirty="0"/>
                 <a:t>1,2,3</a:t>
               </a:r>
               <a:endParaRPr lang="en-US" sz="3200" dirty="0"/>
@@ -5492,7 +5360,7 @@
             <a:p>
               <a:pPr algn="ctr"/>
               <a:r>
-                <a:rPr lang="en-US" sz="2400" smtClean="0"/>
+                <a:rPr lang="en-US" sz="2400"/>
                 <a:t>M+3</a:t>
               </a:r>
               <a:endParaRPr lang="en-US" sz="2400" dirty="0"/>
@@ -5510,13 +5378,6 @@
   <p:clrMapOvr>
     <a:masterClrMapping/>
   </p:clrMapOvr>
-  <p:timing>
-    <p:tnLst>
-      <p:par>
-        <p:cTn id="1" dur="indefinite" restart="never" nodeType="tmRoot"/>
-      </p:par>
-    </p:tnLst>
-  </p:timing>
 </p:sld>
 </file>
 
@@ -5690,10 +5551,9 @@
             <a:p>
               <a:pPr algn="ctr"/>
               <a:r>
-                <a:rPr lang="en-US" sz="2400" dirty="0" smtClean="0"/>
+                <a:rPr lang="en-US" sz="2400" dirty="0"/>
                 <a:t>M+0</a:t>
               </a:r>
-              <a:endParaRPr lang="en-US" sz="2400" dirty="0"/>
             </a:p>
           </p:txBody>
         </p:sp>
@@ -5721,10 +5581,9 @@
             <a:p>
               <a:pPr algn="ctr"/>
               <a:r>
-                <a:rPr lang="en-US" sz="2400" dirty="0" smtClean="0"/>
+                <a:rPr lang="en-US" sz="2400" dirty="0"/>
                 <a:t>M+1</a:t>
               </a:r>
-              <a:endParaRPr lang="en-US" sz="2400" dirty="0"/>
             </a:p>
           </p:txBody>
         </p:sp>
@@ -5755,7 +5614,7 @@
                 <a:t>B</a:t>
               </a:r>
               <a:r>
-                <a:rPr lang="en-US" sz="3200" baseline="-25000" dirty="0" smtClean="0"/>
+                <a:rPr lang="en-US" sz="3200" baseline="-25000" dirty="0"/>
                 <a:t>1</a:t>
               </a:r>
               <a:endParaRPr lang="en-US" sz="3200" dirty="0"/>
@@ -5848,18 +5707,13 @@
                 <a:p>
                   <a:pPr algn="ctr"/>
                   <a:r>
-                    <a:rPr lang="en-US" b="1" dirty="0" smtClean="0">
+                    <a:rPr lang="en-US" b="1" dirty="0">
                       <a:solidFill>
                         <a:schemeClr val="tx1"/>
                       </a:solidFill>
                     </a:rPr>
                     <a:t>0x0</a:t>
                   </a:r>
-                  <a:endParaRPr lang="en-US" b="1" dirty="0">
-                    <a:solidFill>
-                      <a:schemeClr val="tx1"/>
-                    </a:solidFill>
-                  </a:endParaRPr>
                 </a:p>
               </p:txBody>
             </p:sp>
@@ -5988,10 +5842,9 @@
               <a:p>
                 <a:pPr algn="ctr"/>
                 <a:r>
-                  <a:rPr lang="en-US" sz="2400" dirty="0" smtClean="0"/>
+                  <a:rPr lang="en-US" sz="2400" dirty="0"/>
                   <a:t>M+0</a:t>
                 </a:r>
-                <a:endParaRPr lang="en-US" sz="2400" dirty="0"/>
               </a:p>
             </p:txBody>
           </p:sp>
@@ -6019,10 +5872,9 @@
               <a:p>
                 <a:pPr algn="ctr"/>
                 <a:r>
-                  <a:rPr lang="en-US" sz="2400" dirty="0" smtClean="0"/>
+                  <a:rPr lang="en-US" sz="2400" dirty="0"/>
                   <a:t>M+1</a:t>
                 </a:r>
-                <a:endParaRPr lang="en-US" sz="2400" dirty="0"/>
               </a:p>
             </p:txBody>
           </p:sp>
@@ -6050,10 +5902,9 @@
               <a:p>
                 <a:pPr algn="ctr"/>
                 <a:r>
-                  <a:rPr lang="en-US" sz="2400" dirty="0" smtClean="0"/>
+                  <a:rPr lang="en-US" sz="2400" dirty="0"/>
                   <a:t>M+2</a:t>
                 </a:r>
-                <a:endParaRPr lang="en-US" sz="2400" dirty="0"/>
               </a:p>
             </p:txBody>
           </p:sp>
@@ -6081,11 +5932,11 @@
             <a:lstStyle/>
             <a:p>
               <a:r>
-                <a:rPr lang="en-US" sz="3200" dirty="0" smtClean="0"/>
+                <a:rPr lang="en-US" sz="3200" dirty="0"/>
                 <a:t>A</a:t>
               </a:r>
               <a:r>
-                <a:rPr lang="en-US" sz="3200" baseline="-25000" dirty="0" smtClean="0"/>
+                <a:rPr lang="en-US" sz="3200" baseline="-25000" dirty="0"/>
                 <a:t>1,2</a:t>
               </a:r>
               <a:endParaRPr lang="en-US" sz="3200" dirty="0"/>
@@ -6117,10 +5968,9 @@
           <a:p>
             <a:pPr algn="ctr"/>
             <a:r>
-              <a:rPr lang="en-US" sz="4800" dirty="0" smtClean="0"/>
+              <a:rPr lang="en-US" sz="4800" dirty="0"/>
               <a:t>=</a:t>
             </a:r>
-            <a:endParaRPr lang="en-US" sz="4800" dirty="0"/>
           </a:p>
         </p:txBody>
       </p:sp>
@@ -6133,9 +5983,9 @@
         <p:grpSpPr>
           <a:xfrm>
             <a:off x="7213835" y="1206314"/>
-            <a:ext cx="2829463" cy="5102856"/>
+            <a:ext cx="2848862" cy="5102856"/>
             <a:chOff x="7213835" y="1240793"/>
-            <a:chExt cx="2829463" cy="5102856"/>
+            <a:chExt cx="2848862" cy="5102856"/>
           </a:xfrm>
         </p:grpSpPr>
         <p:grpSp>
@@ -6146,10 +5996,10 @@
           </p:nvGrpSpPr>
           <p:grpSpPr>
             <a:xfrm>
-              <a:off x="8840426" y="1543049"/>
-              <a:ext cx="1202872" cy="3600450"/>
-              <a:chOff x="4760460" y="-2162610"/>
-              <a:chExt cx="1202872" cy="3600450"/>
+              <a:off x="8840426" y="1565257"/>
+              <a:ext cx="1222271" cy="3578242"/>
+              <a:chOff x="4760460" y="-2140402"/>
+              <a:chExt cx="1222271" cy="3578242"/>
             </a:xfrm>
           </p:grpSpPr>
           <p:sp>
@@ -6160,7 +6010,7 @@
             </p:nvSpPr>
             <p:spPr>
               <a:xfrm>
-                <a:off x="4763182" y="-2162610"/>
+                <a:off x="4782581" y="-2140402"/>
                 <a:ext cx="1200150" cy="1200150"/>
               </a:xfrm>
               <a:prstGeom prst="rect">
@@ -6195,18 +6045,13 @@
               <a:p>
                 <a:pPr algn="ctr"/>
                 <a:r>
-                  <a:rPr lang="en-US" dirty="0" smtClean="0">
+                  <a:rPr lang="en-US" b="1" dirty="0">
                     <a:solidFill>
                       <a:schemeClr val="tx1"/>
                     </a:solidFill>
                   </a:rPr>
                   <a:t>0</a:t>
                 </a:r>
-                <a:endParaRPr lang="en-US" dirty="0">
-                  <a:solidFill>
-                    <a:schemeClr val="tx1"/>
-                  </a:solidFill>
-                </a:endParaRPr>
               </a:p>
             </p:txBody>
           </p:sp>
@@ -6253,18 +6098,13 @@
               <a:p>
                 <a:pPr algn="ctr"/>
                 <a:r>
-                  <a:rPr lang="en-US" dirty="0" smtClean="0">
+                  <a:rPr lang="en-US" dirty="0">
                     <a:solidFill>
                       <a:schemeClr val="tx1"/>
                     </a:solidFill>
                   </a:rPr>
                   <a:t>?</a:t>
                 </a:r>
-                <a:endParaRPr lang="en-US" dirty="0">
-                  <a:solidFill>
-                    <a:schemeClr val="tx1"/>
-                  </a:solidFill>
-                </a:endParaRPr>
               </a:p>
             </p:txBody>
           </p:sp>
@@ -6311,18 +6151,13 @@
               <a:p>
                 <a:pPr algn="ctr"/>
                 <a:r>
-                  <a:rPr lang="en-US" dirty="0" smtClean="0">
+                  <a:rPr lang="en-US" dirty="0">
                     <a:solidFill>
                       <a:schemeClr val="tx1"/>
                     </a:solidFill>
                   </a:rPr>
                   <a:t>?</a:t>
                 </a:r>
-                <a:endParaRPr lang="en-US" dirty="0">
-                  <a:solidFill>
-                    <a:schemeClr val="tx1"/>
-                  </a:solidFill>
-                </a:endParaRPr>
               </a:p>
             </p:txBody>
           </p:sp>
@@ -6351,10 +6186,9 @@
             <a:p>
               <a:pPr algn="ctr"/>
               <a:r>
-                <a:rPr lang="en-US" sz="2400" dirty="0" smtClean="0"/>
+                <a:rPr lang="en-US" sz="2400" dirty="0"/>
                 <a:t>M+0</a:t>
               </a:r>
-              <a:endParaRPr lang="en-US" sz="2400" dirty="0"/>
             </a:p>
           </p:txBody>
         </p:sp>
@@ -6382,10 +6216,9 @@
             <a:p>
               <a:pPr algn="ctr"/>
               <a:r>
-                <a:rPr lang="en-US" sz="2400" dirty="0" smtClean="0"/>
+                <a:rPr lang="en-US" sz="2400" dirty="0"/>
                 <a:t>M+1</a:t>
               </a:r>
-              <a:endParaRPr lang="en-US" sz="2400" dirty="0"/>
             </a:p>
           </p:txBody>
         </p:sp>
@@ -6413,7 +6246,7 @@
             <a:p>
               <a:pPr algn="ctr"/>
               <a:r>
-                <a:rPr lang="en-US" sz="2400" smtClean="0"/>
+                <a:rPr lang="en-US" sz="2400"/>
                 <a:t>M+2</a:t>
               </a:r>
               <a:endParaRPr lang="en-US" sz="2400" dirty="0"/>
@@ -6463,18 +6296,13 @@
             <a:p>
               <a:pPr algn="ctr"/>
               <a:r>
-                <a:rPr lang="en-US" dirty="0" smtClean="0">
+                <a:rPr lang="en-US" dirty="0">
                   <a:solidFill>
                     <a:schemeClr val="tx1"/>
                   </a:solidFill>
                 </a:rPr>
                 <a:t>?</a:t>
               </a:r>
-              <a:endParaRPr lang="en-US" dirty="0">
-                <a:solidFill>
-                  <a:schemeClr val="tx1"/>
-                </a:solidFill>
-              </a:endParaRPr>
             </a:p>
           </p:txBody>
         </p:sp>
@@ -6501,11 +6329,11 @@
             <a:lstStyle/>
             <a:p>
               <a:r>
-                <a:rPr lang="en-US" sz="3200" dirty="0" smtClean="0"/>
+                <a:rPr lang="en-US" sz="3200" dirty="0"/>
                 <a:t>C</a:t>
               </a:r>
               <a:r>
-                <a:rPr lang="en-US" sz="3200" baseline="-25000" dirty="0" smtClean="0"/>
+                <a:rPr lang="en-US" sz="3200" baseline="-25000" dirty="0"/>
                 <a:t>1,2,3</a:t>
               </a:r>
               <a:endParaRPr lang="en-US" sz="3200" dirty="0"/>
@@ -6536,7 +6364,7 @@
             <a:p>
               <a:pPr algn="ctr"/>
               <a:r>
-                <a:rPr lang="en-US" sz="2400" smtClean="0"/>
+                <a:rPr lang="en-US" sz="2400"/>
                 <a:t>M+3</a:t>
               </a:r>
               <a:endParaRPr lang="en-US" sz="2400" dirty="0"/>
@@ -6554,13 +6382,6 @@
   <p:clrMapOvr>
     <a:masterClrMapping/>
   </p:clrMapOvr>
-  <p:timing>
-    <p:tnLst>
-      <p:par>
-        <p:cTn id="1" dur="indefinite" restart="never" nodeType="tmRoot"/>
-      </p:par>
-    </p:tnLst>
-  </p:timing>
 </p:sld>
 </file>
 
@@ -6734,10 +6555,9 @@
             <a:p>
               <a:pPr algn="ctr"/>
               <a:r>
-                <a:rPr lang="en-US" sz="2400" dirty="0" smtClean="0"/>
+                <a:rPr lang="en-US" sz="2400" dirty="0"/>
                 <a:t>M+0</a:t>
               </a:r>
-              <a:endParaRPr lang="en-US" sz="2400" dirty="0"/>
             </a:p>
           </p:txBody>
         </p:sp>
@@ -6765,10 +6585,9 @@
             <a:p>
               <a:pPr algn="ctr"/>
               <a:r>
-                <a:rPr lang="en-US" sz="2400" dirty="0" smtClean="0"/>
+                <a:rPr lang="en-US" sz="2400" dirty="0"/>
                 <a:t>M+1</a:t>
               </a:r>
-              <a:endParaRPr lang="en-US" sz="2400" dirty="0"/>
             </a:p>
           </p:txBody>
         </p:sp>
@@ -6799,7 +6618,7 @@
                 <a:t>B</a:t>
               </a:r>
               <a:r>
-                <a:rPr lang="en-US" sz="3200" baseline="-25000" dirty="0" smtClean="0"/>
+                <a:rPr lang="en-US" sz="3200" baseline="-25000" dirty="0"/>
                 <a:t>1</a:t>
               </a:r>
               <a:endParaRPr lang="en-US" sz="3200" dirty="0"/>
@@ -6892,18 +6711,13 @@
                 <a:p>
                   <a:pPr algn="ctr"/>
                   <a:r>
-                    <a:rPr lang="en-US" b="1" dirty="0" smtClean="0">
+                    <a:rPr lang="en-US" b="1" dirty="0">
                       <a:solidFill>
                         <a:schemeClr val="tx1"/>
                       </a:solidFill>
                     </a:rPr>
                     <a:t>0x1</a:t>
                   </a:r>
-                  <a:endParaRPr lang="en-US" b="1" dirty="0">
-                    <a:solidFill>
-                      <a:schemeClr val="tx1"/>
-                    </a:solidFill>
-                  </a:endParaRPr>
                 </a:p>
               </p:txBody>
             </p:sp>
@@ -6950,18 +6764,13 @@
                 <a:p>
                   <a:pPr algn="ctr"/>
                   <a:r>
-                    <a:rPr lang="en-US" b="1" dirty="0" smtClean="0">
+                    <a:rPr lang="en-US" b="1" dirty="0">
                       <a:solidFill>
                         <a:schemeClr val="tx1"/>
                       </a:solidFill>
                     </a:rPr>
                     <a:t>0.5x0</a:t>
                   </a:r>
-                  <a:endParaRPr lang="en-US" b="1" dirty="0">
-                    <a:solidFill>
-                      <a:schemeClr val="tx1"/>
-                    </a:solidFill>
-                  </a:endParaRPr>
                 </a:p>
               </p:txBody>
             </p:sp>
@@ -7040,10 +6849,9 @@
               <a:p>
                 <a:pPr algn="ctr"/>
                 <a:r>
-                  <a:rPr lang="en-US" sz="2400" dirty="0" smtClean="0"/>
+                  <a:rPr lang="en-US" sz="2400" dirty="0"/>
                   <a:t>M+0</a:t>
                 </a:r>
-                <a:endParaRPr lang="en-US" sz="2400" dirty="0"/>
               </a:p>
             </p:txBody>
           </p:sp>
@@ -7071,10 +6879,9 @@
               <a:p>
                 <a:pPr algn="ctr"/>
                 <a:r>
-                  <a:rPr lang="en-US" sz="2400" dirty="0" smtClean="0"/>
+                  <a:rPr lang="en-US" sz="2400" dirty="0"/>
                   <a:t>M+1</a:t>
                 </a:r>
-                <a:endParaRPr lang="en-US" sz="2400" dirty="0"/>
               </a:p>
             </p:txBody>
           </p:sp>
@@ -7102,10 +6909,9 @@
               <a:p>
                 <a:pPr algn="ctr"/>
                 <a:r>
-                  <a:rPr lang="en-US" sz="2400" dirty="0" smtClean="0"/>
+                  <a:rPr lang="en-US" sz="2400" dirty="0"/>
                   <a:t>M+2</a:t>
                 </a:r>
-                <a:endParaRPr lang="en-US" sz="2400" dirty="0"/>
               </a:p>
             </p:txBody>
           </p:sp>
@@ -7133,11 +6939,11 @@
             <a:lstStyle/>
             <a:p>
               <a:r>
-                <a:rPr lang="en-US" sz="3200" dirty="0" smtClean="0"/>
+                <a:rPr lang="en-US" sz="3200" dirty="0"/>
                 <a:t>A</a:t>
               </a:r>
               <a:r>
-                <a:rPr lang="en-US" sz="3200" baseline="-25000" dirty="0" smtClean="0"/>
+                <a:rPr lang="en-US" sz="3200" baseline="-25000" dirty="0"/>
                 <a:t>1,2</a:t>
               </a:r>
               <a:endParaRPr lang="en-US" sz="3200" dirty="0"/>
@@ -7169,10 +6975,9 @@
           <a:p>
             <a:pPr algn="ctr"/>
             <a:r>
-              <a:rPr lang="en-US" sz="4800" dirty="0" smtClean="0"/>
+              <a:rPr lang="en-US" sz="4800" dirty="0"/>
               <a:t>=</a:t>
             </a:r>
-            <a:endParaRPr lang="en-US" sz="4800" dirty="0"/>
           </a:p>
         </p:txBody>
       </p:sp>
@@ -7246,11 +7051,14 @@
               <a:lstStyle/>
               <a:p>
                 <a:pPr algn="ctr"/>
-                <a:endParaRPr lang="en-US" dirty="0">
-                  <a:solidFill>
-                    <a:schemeClr val="tx1"/>
-                  </a:solidFill>
-                </a:endParaRPr>
+                <a:r>
+                  <a:rPr lang="en-US" dirty="0">
+                    <a:solidFill>
+                      <a:schemeClr val="tx1"/>
+                    </a:solidFill>
+                  </a:rPr>
+                  <a:t>0</a:t>
+                </a:r>
               </a:p>
             </p:txBody>
           </p:sp>
@@ -7297,18 +7105,13 @@
               <a:p>
                 <a:pPr algn="ctr"/>
                 <a:r>
-                  <a:rPr lang="en-US" dirty="0">
+                  <a:rPr lang="en-US" b="1" dirty="0">
                     <a:solidFill>
                       <a:schemeClr val="tx1"/>
                     </a:solidFill>
                   </a:rPr>
                   <a:t>0</a:t>
                 </a:r>
-                <a:endParaRPr lang="en-US" dirty="0">
-                  <a:solidFill>
-                    <a:schemeClr val="tx1"/>
-                  </a:solidFill>
-                </a:endParaRPr>
               </a:p>
             </p:txBody>
           </p:sp>
@@ -7355,18 +7158,13 @@
               <a:p>
                 <a:pPr algn="ctr"/>
                 <a:r>
-                  <a:rPr lang="en-US" dirty="0" smtClean="0">
+                  <a:rPr lang="en-US" dirty="0">
                     <a:solidFill>
                       <a:schemeClr val="tx1"/>
                     </a:solidFill>
                   </a:rPr>
                   <a:t>?</a:t>
                 </a:r>
-                <a:endParaRPr lang="en-US" dirty="0">
-                  <a:solidFill>
-                    <a:schemeClr val="tx1"/>
-                  </a:solidFill>
-                </a:endParaRPr>
               </a:p>
             </p:txBody>
           </p:sp>
@@ -7395,10 +7193,9 @@
             <a:p>
               <a:pPr algn="ctr"/>
               <a:r>
-                <a:rPr lang="en-US" sz="2400" dirty="0" smtClean="0"/>
+                <a:rPr lang="en-US" sz="2400" dirty="0"/>
                 <a:t>M+0</a:t>
               </a:r>
-              <a:endParaRPr lang="en-US" sz="2400" dirty="0"/>
             </a:p>
           </p:txBody>
         </p:sp>
@@ -7426,10 +7223,9 @@
             <a:p>
               <a:pPr algn="ctr"/>
               <a:r>
-                <a:rPr lang="en-US" sz="2400" dirty="0" smtClean="0"/>
+                <a:rPr lang="en-US" sz="2400" dirty="0"/>
                 <a:t>M+1</a:t>
               </a:r>
-              <a:endParaRPr lang="en-US" sz="2400" dirty="0"/>
             </a:p>
           </p:txBody>
         </p:sp>
@@ -7457,7 +7253,7 @@
             <a:p>
               <a:pPr algn="ctr"/>
               <a:r>
-                <a:rPr lang="en-US" sz="2400" smtClean="0"/>
+                <a:rPr lang="en-US" sz="2400"/>
                 <a:t>M+2</a:t>
               </a:r>
               <a:endParaRPr lang="en-US" sz="2400" dirty="0"/>
@@ -7507,18 +7303,13 @@
             <a:p>
               <a:pPr algn="ctr"/>
               <a:r>
-                <a:rPr lang="en-US" dirty="0" smtClean="0">
+                <a:rPr lang="en-US" dirty="0">
                   <a:solidFill>
                     <a:schemeClr val="tx1"/>
                   </a:solidFill>
                 </a:rPr>
                 <a:t>?</a:t>
               </a:r>
-              <a:endParaRPr lang="en-US" dirty="0">
-                <a:solidFill>
-                  <a:schemeClr val="tx1"/>
-                </a:solidFill>
-              </a:endParaRPr>
             </a:p>
           </p:txBody>
         </p:sp>
@@ -7545,11 +7336,11 @@
             <a:lstStyle/>
             <a:p>
               <a:r>
-                <a:rPr lang="en-US" sz="3200" dirty="0" smtClean="0"/>
+                <a:rPr lang="en-US" sz="3200" dirty="0"/>
                 <a:t>C</a:t>
               </a:r>
               <a:r>
-                <a:rPr lang="en-US" sz="3200" baseline="-25000" dirty="0" smtClean="0"/>
+                <a:rPr lang="en-US" sz="3200" baseline="-25000" dirty="0"/>
                 <a:t>1,2,3</a:t>
               </a:r>
               <a:endParaRPr lang="en-US" sz="3200" dirty="0"/>
@@ -7580,7 +7371,7 @@
             <a:p>
               <a:pPr algn="ctr"/>
               <a:r>
-                <a:rPr lang="en-US" sz="2400" smtClean="0"/>
+                <a:rPr lang="en-US" sz="2400"/>
                 <a:t>M+3</a:t>
               </a:r>
               <a:endParaRPr lang="en-US" sz="2400" dirty="0"/>
@@ -7624,13 +7415,6 @@
   <p:clrMapOvr>
     <a:masterClrMapping/>
   </p:clrMapOvr>
-  <p:timing>
-    <p:tnLst>
-      <p:par>
-        <p:cTn id="1" dur="indefinite" restart="never" nodeType="tmRoot"/>
-      </p:par>
-    </p:tnLst>
-  </p:timing>
 </p:sld>
 </file>
 
@@ -7804,10 +7588,9 @@
             <a:p>
               <a:pPr algn="ctr"/>
               <a:r>
-                <a:rPr lang="en-US" sz="2400" dirty="0" smtClean="0"/>
+                <a:rPr lang="en-US" sz="2400" dirty="0"/>
                 <a:t>M+0</a:t>
               </a:r>
-              <a:endParaRPr lang="en-US" sz="2400" dirty="0"/>
             </a:p>
           </p:txBody>
         </p:sp>
@@ -7835,10 +7618,9 @@
             <a:p>
               <a:pPr algn="ctr"/>
               <a:r>
-                <a:rPr lang="en-US" sz="2400" dirty="0" smtClean="0"/>
+                <a:rPr lang="en-US" sz="2400" dirty="0"/>
                 <a:t>M+1</a:t>
               </a:r>
-              <a:endParaRPr lang="en-US" sz="2400" dirty="0"/>
             </a:p>
           </p:txBody>
         </p:sp>
@@ -7869,7 +7651,7 @@
                 <a:t>B</a:t>
               </a:r>
               <a:r>
-                <a:rPr lang="en-US" sz="3200" baseline="-25000" dirty="0" smtClean="0"/>
+                <a:rPr lang="en-US" sz="3200" baseline="-25000" dirty="0"/>
                 <a:t>1</a:t>
               </a:r>
               <a:endParaRPr lang="en-US" sz="3200" dirty="0"/>
@@ -8012,18 +7794,13 @@
                 <a:p>
                   <a:pPr algn="ctr"/>
                   <a:r>
-                    <a:rPr lang="en-US" b="1" dirty="0" smtClean="0">
+                    <a:rPr lang="en-US" b="1" dirty="0">
                       <a:solidFill>
                         <a:schemeClr val="tx1"/>
                       </a:solidFill>
                     </a:rPr>
                     <a:t>0.5x1</a:t>
                   </a:r>
-                  <a:endParaRPr lang="en-US" b="1" dirty="0">
-                    <a:solidFill>
-                      <a:schemeClr val="tx1"/>
-                    </a:solidFill>
-                  </a:endParaRPr>
                 </a:p>
               </p:txBody>
             </p:sp>
@@ -8070,18 +7847,13 @@
                 <a:p>
                   <a:pPr algn="ctr"/>
                   <a:r>
-                    <a:rPr lang="en-US" b="1" dirty="0" smtClean="0">
+                    <a:rPr lang="en-US" b="1" dirty="0">
                       <a:solidFill>
                         <a:schemeClr val="tx1"/>
                       </a:solidFill>
                     </a:rPr>
                     <a:t>0.5x0</a:t>
                   </a:r>
-                  <a:endParaRPr lang="en-US" b="1" dirty="0">
-                    <a:solidFill>
-                      <a:schemeClr val="tx1"/>
-                    </a:solidFill>
-                  </a:endParaRPr>
                 </a:p>
               </p:txBody>
             </p:sp>
@@ -8110,10 +7882,9 @@
               <a:p>
                 <a:pPr algn="ctr"/>
                 <a:r>
-                  <a:rPr lang="en-US" sz="2400" dirty="0" smtClean="0"/>
+                  <a:rPr lang="en-US" sz="2400" dirty="0"/>
                   <a:t>M+0</a:t>
                 </a:r>
-                <a:endParaRPr lang="en-US" sz="2400" dirty="0"/>
               </a:p>
             </p:txBody>
           </p:sp>
@@ -8141,10 +7912,9 @@
               <a:p>
                 <a:pPr algn="ctr"/>
                 <a:r>
-                  <a:rPr lang="en-US" sz="2400" dirty="0" smtClean="0"/>
+                  <a:rPr lang="en-US" sz="2400" dirty="0"/>
                   <a:t>M+1</a:t>
                 </a:r>
-                <a:endParaRPr lang="en-US" sz="2400" dirty="0"/>
               </a:p>
             </p:txBody>
           </p:sp>
@@ -8172,10 +7942,9 @@
               <a:p>
                 <a:pPr algn="ctr"/>
                 <a:r>
-                  <a:rPr lang="en-US" sz="2400" dirty="0" smtClean="0"/>
+                  <a:rPr lang="en-US" sz="2400" dirty="0"/>
                   <a:t>M+2</a:t>
                 </a:r>
-                <a:endParaRPr lang="en-US" sz="2400" dirty="0"/>
               </a:p>
             </p:txBody>
           </p:sp>
@@ -8203,11 +7972,11 @@
             <a:lstStyle/>
             <a:p>
               <a:r>
-                <a:rPr lang="en-US" sz="3200" dirty="0" smtClean="0"/>
+                <a:rPr lang="en-US" sz="3200" dirty="0"/>
                 <a:t>A</a:t>
               </a:r>
               <a:r>
-                <a:rPr lang="en-US" sz="3200" baseline="-25000" dirty="0" smtClean="0"/>
+                <a:rPr lang="en-US" sz="3200" baseline="-25000" dirty="0"/>
                 <a:t>1,2</a:t>
               </a:r>
               <a:endParaRPr lang="en-US" sz="3200" dirty="0"/>
@@ -8239,10 +8008,9 @@
           <a:p>
             <a:pPr algn="ctr"/>
             <a:r>
-              <a:rPr lang="en-US" sz="4800" dirty="0" smtClean="0"/>
+              <a:rPr lang="en-US" sz="4800" dirty="0"/>
               <a:t>=</a:t>
             </a:r>
-            <a:endParaRPr lang="en-US" sz="4800" dirty="0"/>
           </a:p>
         </p:txBody>
       </p:sp>
@@ -8316,11 +8084,14 @@
               <a:lstStyle/>
               <a:p>
                 <a:pPr algn="ctr"/>
-                <a:endParaRPr lang="en-US" dirty="0">
-                  <a:solidFill>
-                    <a:schemeClr val="tx1"/>
-                  </a:solidFill>
-                </a:endParaRPr>
+                <a:r>
+                  <a:rPr lang="en-US" dirty="0">
+                    <a:solidFill>
+                      <a:schemeClr val="tx1"/>
+                    </a:solidFill>
+                  </a:rPr>
+                  <a:t>0</a:t>
+                </a:r>
               </a:p>
             </p:txBody>
           </p:sp>
@@ -8366,11 +8137,14 @@
               <a:lstStyle/>
               <a:p>
                 <a:pPr algn="ctr"/>
-                <a:endParaRPr lang="en-US" dirty="0">
-                  <a:solidFill>
-                    <a:schemeClr val="tx1"/>
-                  </a:solidFill>
-                </a:endParaRPr>
+                <a:r>
+                  <a:rPr lang="en-US" dirty="0">
+                    <a:solidFill>
+                      <a:schemeClr val="tx1"/>
+                    </a:solidFill>
+                  </a:rPr>
+                  <a:t>0</a:t>
+                </a:r>
               </a:p>
             </p:txBody>
           </p:sp>
@@ -8417,18 +8191,13 @@
               <a:p>
                 <a:pPr algn="ctr"/>
                 <a:r>
-                  <a:rPr lang="en-US" b="1" dirty="0" smtClean="0">
+                  <a:rPr lang="en-US" b="1" dirty="0">
                     <a:solidFill>
                       <a:schemeClr val="tx1"/>
                     </a:solidFill>
                   </a:rPr>
                   <a:t>0.5</a:t>
                 </a:r>
-                <a:endParaRPr lang="en-US" b="1" dirty="0">
-                  <a:solidFill>
-                    <a:schemeClr val="tx1"/>
-                  </a:solidFill>
-                </a:endParaRPr>
               </a:p>
             </p:txBody>
           </p:sp>
@@ -8457,10 +8226,9 @@
             <a:p>
               <a:pPr algn="ctr"/>
               <a:r>
-                <a:rPr lang="en-US" sz="2400" dirty="0" smtClean="0"/>
+                <a:rPr lang="en-US" sz="2400" dirty="0"/>
                 <a:t>M+0</a:t>
               </a:r>
-              <a:endParaRPr lang="en-US" sz="2400" dirty="0"/>
             </a:p>
           </p:txBody>
         </p:sp>
@@ -8488,10 +8256,9 @@
             <a:p>
               <a:pPr algn="ctr"/>
               <a:r>
-                <a:rPr lang="en-US" sz="2400" dirty="0" smtClean="0"/>
+                <a:rPr lang="en-US" sz="2400" dirty="0"/>
                 <a:t>M+1</a:t>
               </a:r>
-              <a:endParaRPr lang="en-US" sz="2400" dirty="0"/>
             </a:p>
           </p:txBody>
         </p:sp>
@@ -8519,7 +8286,7 @@
             <a:p>
               <a:pPr algn="ctr"/>
               <a:r>
-                <a:rPr lang="en-US" sz="2400" smtClean="0"/>
+                <a:rPr lang="en-US" sz="2400"/>
                 <a:t>M+2</a:t>
               </a:r>
               <a:endParaRPr lang="en-US" sz="2400" dirty="0"/>
@@ -8569,18 +8336,13 @@
             <a:p>
               <a:pPr algn="ctr"/>
               <a:r>
-                <a:rPr lang="en-US" dirty="0" smtClean="0">
+                <a:rPr lang="en-US" dirty="0">
                   <a:solidFill>
                     <a:schemeClr val="tx1"/>
                   </a:solidFill>
                 </a:rPr>
                 <a:t>?</a:t>
               </a:r>
-              <a:endParaRPr lang="en-US" dirty="0">
-                <a:solidFill>
-                  <a:schemeClr val="tx1"/>
-                </a:solidFill>
-              </a:endParaRPr>
             </a:p>
           </p:txBody>
         </p:sp>
@@ -8607,11 +8369,11 @@
             <a:lstStyle/>
             <a:p>
               <a:r>
-                <a:rPr lang="en-US" sz="3200" dirty="0" smtClean="0"/>
+                <a:rPr lang="en-US" sz="3200" dirty="0"/>
                 <a:t>C</a:t>
               </a:r>
               <a:r>
-                <a:rPr lang="en-US" sz="3200" baseline="-25000" dirty="0" smtClean="0"/>
+                <a:rPr lang="en-US" sz="3200" baseline="-25000" dirty="0"/>
                 <a:t>1,2,3</a:t>
               </a:r>
               <a:endParaRPr lang="en-US" sz="3200" dirty="0"/>
@@ -8642,7 +8404,7 @@
             <a:p>
               <a:pPr algn="ctr"/>
               <a:r>
-                <a:rPr lang="en-US" sz="2400" smtClean="0"/>
+                <a:rPr lang="en-US" sz="2400"/>
                 <a:t>M+3</a:t>
               </a:r>
               <a:endParaRPr lang="en-US" sz="2400" dirty="0"/>
@@ -8686,13 +8448,6 @@
   <p:clrMapOvr>
     <a:masterClrMapping/>
   </p:clrMapOvr>
-  <p:timing>
-    <p:tnLst>
-      <p:par>
-        <p:cTn id="1" dur="indefinite" restart="never" nodeType="tmRoot"/>
-      </p:par>
-    </p:tnLst>
-  </p:timing>
 </p:sld>
 </file>
 
@@ -8866,10 +8621,9 @@
             <a:p>
               <a:pPr algn="ctr"/>
               <a:r>
-                <a:rPr lang="en-US" sz="2400" dirty="0" smtClean="0"/>
+                <a:rPr lang="en-US" sz="2400" dirty="0"/>
                 <a:t>M+0</a:t>
               </a:r>
-              <a:endParaRPr lang="en-US" sz="2400" dirty="0"/>
             </a:p>
           </p:txBody>
         </p:sp>
@@ -8897,10 +8651,9 @@
             <a:p>
               <a:pPr algn="ctr"/>
               <a:r>
-                <a:rPr lang="en-US" sz="2400" dirty="0" smtClean="0"/>
+                <a:rPr lang="en-US" sz="2400" dirty="0"/>
                 <a:t>M+1</a:t>
               </a:r>
-              <a:endParaRPr lang="en-US" sz="2400" dirty="0"/>
             </a:p>
           </p:txBody>
         </p:sp>
@@ -8931,7 +8684,7 @@
                 <a:t>B</a:t>
               </a:r>
               <a:r>
-                <a:rPr lang="en-US" sz="3200" baseline="-25000" dirty="0" smtClean="0"/>
+                <a:rPr lang="en-US" sz="3200" baseline="-25000" dirty="0"/>
                 <a:t>1</a:t>
               </a:r>
               <a:endParaRPr lang="en-US" sz="3200" dirty="0"/>
@@ -9124,18 +8877,13 @@
                 <a:p>
                   <a:pPr algn="ctr"/>
                   <a:r>
-                    <a:rPr lang="en-US" b="1" dirty="0" smtClean="0">
+                    <a:rPr lang="en-US" b="1" dirty="0">
                       <a:solidFill>
                         <a:schemeClr val="tx1"/>
                       </a:solidFill>
                     </a:rPr>
                     <a:t>0.5x1</a:t>
                   </a:r>
-                  <a:endParaRPr lang="en-US" b="1" dirty="0">
-                    <a:solidFill>
-                      <a:schemeClr val="tx1"/>
-                    </a:solidFill>
-                  </a:endParaRPr>
                 </a:p>
               </p:txBody>
             </p:sp>
@@ -9164,10 +8912,9 @@
               <a:p>
                 <a:pPr algn="ctr"/>
                 <a:r>
-                  <a:rPr lang="en-US" sz="2400" dirty="0" smtClean="0"/>
+                  <a:rPr lang="en-US" sz="2400" dirty="0"/>
                   <a:t>M+0</a:t>
                 </a:r>
-                <a:endParaRPr lang="en-US" sz="2400" dirty="0"/>
               </a:p>
             </p:txBody>
           </p:sp>
@@ -9195,10 +8942,9 @@
               <a:p>
                 <a:pPr algn="ctr"/>
                 <a:r>
-                  <a:rPr lang="en-US" sz="2400" dirty="0" smtClean="0"/>
+                  <a:rPr lang="en-US" sz="2400" dirty="0"/>
                   <a:t>M+1</a:t>
                 </a:r>
-                <a:endParaRPr lang="en-US" sz="2400" dirty="0"/>
               </a:p>
             </p:txBody>
           </p:sp>
@@ -9226,10 +8972,9 @@
               <a:p>
                 <a:pPr algn="ctr"/>
                 <a:r>
-                  <a:rPr lang="en-US" sz="2400" dirty="0" smtClean="0"/>
+                  <a:rPr lang="en-US" sz="2400" dirty="0"/>
                   <a:t>M+2</a:t>
                 </a:r>
-                <a:endParaRPr lang="en-US" sz="2400" dirty="0"/>
               </a:p>
             </p:txBody>
           </p:sp>
@@ -9257,11 +9002,11 @@
             <a:lstStyle/>
             <a:p>
               <a:r>
-                <a:rPr lang="en-US" sz="3200" dirty="0" smtClean="0"/>
+                <a:rPr lang="en-US" sz="3200" dirty="0"/>
                 <a:t>A</a:t>
               </a:r>
               <a:r>
-                <a:rPr lang="en-US" sz="3200" baseline="-25000" dirty="0" smtClean="0"/>
+                <a:rPr lang="en-US" sz="3200" baseline="-25000" dirty="0"/>
                 <a:t>1,2</a:t>
               </a:r>
               <a:endParaRPr lang="en-US" sz="3200" dirty="0"/>
@@ -9293,10 +9038,9 @@
           <a:p>
             <a:pPr algn="ctr"/>
             <a:r>
-              <a:rPr lang="en-US" sz="4800" dirty="0" smtClean="0"/>
+              <a:rPr lang="en-US" sz="4800" dirty="0"/>
               <a:t>=</a:t>
             </a:r>
-            <a:endParaRPr lang="en-US" sz="4800" dirty="0"/>
           </a:p>
         </p:txBody>
       </p:sp>
@@ -9370,11 +9114,14 @@
               <a:lstStyle/>
               <a:p>
                 <a:pPr algn="ctr"/>
-                <a:endParaRPr lang="en-US" dirty="0">
-                  <a:solidFill>
-                    <a:schemeClr val="tx1"/>
-                  </a:solidFill>
-                </a:endParaRPr>
+                <a:r>
+                  <a:rPr lang="en-US" dirty="0">
+                    <a:solidFill>
+                      <a:schemeClr val="tx1"/>
+                    </a:solidFill>
+                  </a:rPr>
+                  <a:t>0</a:t>
+                </a:r>
               </a:p>
             </p:txBody>
           </p:sp>
@@ -9420,11 +9167,14 @@
               <a:lstStyle/>
               <a:p>
                 <a:pPr algn="ctr"/>
-                <a:endParaRPr lang="en-US" dirty="0">
-                  <a:solidFill>
-                    <a:schemeClr val="tx1"/>
-                  </a:solidFill>
-                </a:endParaRPr>
+                <a:r>
+                  <a:rPr lang="en-US" dirty="0">
+                    <a:solidFill>
+                      <a:schemeClr val="tx1"/>
+                    </a:solidFill>
+                  </a:rPr>
+                  <a:t>0</a:t>
+                </a:r>
               </a:p>
             </p:txBody>
           </p:sp>
@@ -9470,11 +9220,14 @@
               <a:lstStyle/>
               <a:p>
                 <a:pPr algn="ctr"/>
-                <a:endParaRPr lang="en-US" dirty="0">
-                  <a:solidFill>
-                    <a:schemeClr val="tx1"/>
-                  </a:solidFill>
-                </a:endParaRPr>
+                <a:r>
+                  <a:rPr lang="en-US" dirty="0">
+                    <a:solidFill>
+                      <a:schemeClr val="tx1"/>
+                    </a:solidFill>
+                  </a:rPr>
+                  <a:t>0.5</a:t>
+                </a:r>
               </a:p>
             </p:txBody>
           </p:sp>
@@ -9503,10 +9256,9 @@
             <a:p>
               <a:pPr algn="ctr"/>
               <a:r>
-                <a:rPr lang="en-US" sz="2400" dirty="0" smtClean="0"/>
+                <a:rPr lang="en-US" sz="2400" dirty="0"/>
                 <a:t>M+0</a:t>
               </a:r>
-              <a:endParaRPr lang="en-US" sz="2400" dirty="0"/>
             </a:p>
           </p:txBody>
         </p:sp>
@@ -9534,10 +9286,9 @@
             <a:p>
               <a:pPr algn="ctr"/>
               <a:r>
-                <a:rPr lang="en-US" sz="2400" dirty="0" smtClean="0"/>
+                <a:rPr lang="en-US" sz="2400" dirty="0"/>
                 <a:t>M+1</a:t>
               </a:r>
-              <a:endParaRPr lang="en-US" sz="2400" dirty="0"/>
             </a:p>
           </p:txBody>
         </p:sp>
@@ -9565,7 +9316,7 @@
             <a:p>
               <a:pPr algn="ctr"/>
               <a:r>
-                <a:rPr lang="en-US" sz="2400" smtClean="0"/>
+                <a:rPr lang="en-US" sz="2400"/>
                 <a:t>M+2</a:t>
               </a:r>
               <a:endParaRPr lang="en-US" sz="2400" dirty="0"/>
@@ -9615,18 +9366,13 @@
             <a:p>
               <a:pPr algn="ctr"/>
               <a:r>
-                <a:rPr lang="en-US" dirty="0" smtClean="0">
+                <a:rPr lang="en-US" b="1" dirty="0">
                   <a:solidFill>
                     <a:schemeClr val="tx1"/>
                   </a:solidFill>
                 </a:rPr>
                 <a:t>0.5</a:t>
               </a:r>
-              <a:endParaRPr lang="en-US" dirty="0">
-                <a:solidFill>
-                  <a:schemeClr val="tx1"/>
-                </a:solidFill>
-              </a:endParaRPr>
             </a:p>
           </p:txBody>
         </p:sp>
@@ -9653,11 +9399,11 @@
             <a:lstStyle/>
             <a:p>
               <a:r>
-                <a:rPr lang="en-US" sz="3200" dirty="0" smtClean="0"/>
+                <a:rPr lang="en-US" sz="3200" dirty="0"/>
                 <a:t>C</a:t>
               </a:r>
               <a:r>
-                <a:rPr lang="en-US" sz="3200" baseline="-25000" dirty="0" smtClean="0"/>
+                <a:rPr lang="en-US" sz="3200" baseline="-25000" dirty="0"/>
                 <a:t>1,2,3</a:t>
               </a:r>
               <a:endParaRPr lang="en-US" sz="3200" dirty="0"/>
@@ -9688,7 +9434,7 @@
             <a:p>
               <a:pPr algn="ctr"/>
               <a:r>
-                <a:rPr lang="en-US" sz="2400" smtClean="0"/>
+                <a:rPr lang="en-US" sz="2400"/>
                 <a:t>M+3</a:t>
               </a:r>
               <a:endParaRPr lang="en-US" sz="2400" dirty="0"/>
@@ -9732,13 +9478,6 @@
   <p:clrMapOvr>
     <a:masterClrMapping/>
   </p:clrMapOvr>
-  <p:timing>
-    <p:tnLst>
-      <p:par>
-        <p:cTn id="1" dur="indefinite" restart="never" nodeType="tmRoot"/>
-      </p:par>
-    </p:tnLst>
-  </p:timing>
 </p:sld>
 </file>
 
@@ -9830,18 +9569,13 @@
               <a:p>
                 <a:pPr algn="ctr"/>
                 <a:r>
-                  <a:rPr lang="en-US" b="1" dirty="0" smtClean="0">
+                  <a:rPr lang="en-US" b="1" dirty="0">
                     <a:solidFill>
                       <a:schemeClr val="tx1"/>
                     </a:solidFill>
                   </a:rPr>
                   <a:t>1</a:t>
                 </a:r>
-                <a:endParaRPr lang="en-US" b="1" dirty="0">
-                  <a:solidFill>
-                    <a:schemeClr val="tx1"/>
-                  </a:solidFill>
-                </a:endParaRPr>
               </a:p>
             </p:txBody>
           </p:sp>
@@ -9888,18 +9622,13 @@
               <a:p>
                 <a:pPr algn="ctr"/>
                 <a:r>
-                  <a:rPr lang="en-US" b="1" dirty="0" smtClean="0">
+                  <a:rPr lang="en-US" b="1" dirty="0">
                     <a:solidFill>
                       <a:schemeClr val="tx1"/>
                     </a:solidFill>
                   </a:rPr>
                   <a:t>0</a:t>
                 </a:r>
-                <a:endParaRPr lang="en-US" b="1" dirty="0">
-                  <a:solidFill>
-                    <a:schemeClr val="tx1"/>
-                  </a:solidFill>
-                </a:endParaRPr>
               </a:p>
             </p:txBody>
           </p:sp>
@@ -9928,10 +9657,9 @@
             <a:p>
               <a:pPr algn="ctr"/>
               <a:r>
-                <a:rPr lang="en-US" sz="2400" dirty="0" smtClean="0"/>
+                <a:rPr lang="en-US" sz="2400" dirty="0"/>
                 <a:t>M+0</a:t>
               </a:r>
-              <a:endParaRPr lang="en-US" sz="2400" dirty="0"/>
             </a:p>
           </p:txBody>
         </p:sp>
@@ -9959,10 +9687,9 @@
             <a:p>
               <a:pPr algn="ctr"/>
               <a:r>
-                <a:rPr lang="en-US" sz="2400" dirty="0" smtClean="0"/>
+                <a:rPr lang="en-US" sz="2400" dirty="0"/>
                 <a:t>M+1</a:t>
               </a:r>
-              <a:endParaRPr lang="en-US" sz="2400" dirty="0"/>
             </a:p>
           </p:txBody>
         </p:sp>
@@ -9993,7 +9720,7 @@
                 <a:t>B</a:t>
               </a:r>
               <a:r>
-                <a:rPr lang="en-US" sz="3200" baseline="-25000" dirty="0" smtClean="0"/>
+                <a:rPr lang="en-US" sz="3200" baseline="-25000" dirty="0"/>
                 <a:t>1</a:t>
               </a:r>
               <a:endParaRPr lang="en-US" sz="3200" dirty="0"/>
@@ -10086,18 +9813,13 @@
                 <a:p>
                   <a:pPr algn="ctr"/>
                   <a:r>
-                    <a:rPr lang="en-US" b="1" dirty="0" smtClean="0">
+                    <a:rPr lang="en-US" b="1" dirty="0">
                       <a:solidFill>
                         <a:schemeClr val="tx1"/>
                       </a:solidFill>
                     </a:rPr>
                     <a:t>0</a:t>
                   </a:r>
-                  <a:endParaRPr lang="en-US" b="1" dirty="0">
-                    <a:solidFill>
-                      <a:schemeClr val="tx1"/>
-                    </a:solidFill>
-                  </a:endParaRPr>
                 </a:p>
               </p:txBody>
             </p:sp>
@@ -10144,18 +9866,13 @@
                 <a:p>
                   <a:pPr algn="ctr"/>
                   <a:r>
-                    <a:rPr lang="en-US" b="1" dirty="0" smtClean="0">
+                    <a:rPr lang="en-US" b="1" dirty="0">
                       <a:solidFill>
                         <a:schemeClr val="tx1"/>
                       </a:solidFill>
                     </a:rPr>
                     <a:t>0.5</a:t>
                   </a:r>
-                  <a:endParaRPr lang="en-US" b="1" dirty="0">
-                    <a:solidFill>
-                      <a:schemeClr val="tx1"/>
-                    </a:solidFill>
-                  </a:endParaRPr>
                 </a:p>
               </p:txBody>
             </p:sp>
@@ -10202,18 +9919,13 @@
                 <a:p>
                   <a:pPr algn="ctr"/>
                   <a:r>
-                    <a:rPr lang="en-US" b="1" dirty="0" smtClean="0">
+                    <a:rPr lang="en-US" b="1" dirty="0">
                       <a:solidFill>
                         <a:schemeClr val="tx1"/>
                       </a:solidFill>
                     </a:rPr>
                     <a:t>0.5</a:t>
                   </a:r>
-                  <a:endParaRPr lang="en-US" b="1" dirty="0">
-                    <a:solidFill>
-                      <a:schemeClr val="tx1"/>
-                    </a:solidFill>
-                  </a:endParaRPr>
                 </a:p>
               </p:txBody>
             </p:sp>
@@ -10242,10 +9954,9 @@
               <a:p>
                 <a:pPr algn="ctr"/>
                 <a:r>
-                  <a:rPr lang="en-US" sz="2400" dirty="0" smtClean="0"/>
+                  <a:rPr lang="en-US" sz="2400" dirty="0"/>
                   <a:t>M+0</a:t>
                 </a:r>
-                <a:endParaRPr lang="en-US" sz="2400" dirty="0"/>
               </a:p>
             </p:txBody>
           </p:sp>
@@ -10273,10 +9984,9 @@
               <a:p>
                 <a:pPr algn="ctr"/>
                 <a:r>
-                  <a:rPr lang="en-US" sz="2400" dirty="0" smtClean="0"/>
+                  <a:rPr lang="en-US" sz="2400" dirty="0"/>
                   <a:t>M+1</a:t>
                 </a:r>
-                <a:endParaRPr lang="en-US" sz="2400" dirty="0"/>
               </a:p>
             </p:txBody>
           </p:sp>
@@ -10304,10 +10014,9 @@
               <a:p>
                 <a:pPr algn="ctr"/>
                 <a:r>
-                  <a:rPr lang="en-US" sz="2400" dirty="0" smtClean="0"/>
+                  <a:rPr lang="en-US" sz="2400" dirty="0"/>
                   <a:t>M+2</a:t>
                 </a:r>
-                <a:endParaRPr lang="en-US" sz="2400" dirty="0"/>
               </a:p>
             </p:txBody>
           </p:sp>
@@ -10335,11 +10044,11 @@
             <a:lstStyle/>
             <a:p>
               <a:r>
-                <a:rPr lang="en-US" sz="3200" dirty="0" smtClean="0"/>
+                <a:rPr lang="en-US" sz="3200" dirty="0"/>
                 <a:t>A</a:t>
               </a:r>
               <a:r>
-                <a:rPr lang="en-US" sz="3200" baseline="-25000" dirty="0" smtClean="0"/>
+                <a:rPr lang="en-US" sz="3200" baseline="-25000" dirty="0"/>
                 <a:t>1,2</a:t>
               </a:r>
               <a:endParaRPr lang="en-US" sz="3200" dirty="0"/>
@@ -10371,10 +10080,9 @@
           <a:p>
             <a:pPr algn="ctr"/>
             <a:r>
-              <a:rPr lang="en-US" sz="4800" dirty="0" smtClean="0"/>
+              <a:rPr lang="en-US" sz="4800" dirty="0"/>
               <a:t>x</a:t>
             </a:r>
-            <a:endParaRPr lang="en-US" sz="4800" dirty="0"/>
           </a:p>
         </p:txBody>
       </p:sp>
@@ -10402,10 +10110,9 @@
           <a:p>
             <a:pPr algn="ctr"/>
             <a:r>
-              <a:rPr lang="en-US" sz="4800" dirty="0" smtClean="0"/>
+              <a:rPr lang="en-US" sz="4800" dirty="0"/>
               <a:t>=</a:t>
             </a:r>
-            <a:endParaRPr lang="en-US" sz="4800" dirty="0"/>
           </a:p>
         </p:txBody>
       </p:sp>
@@ -10480,18 +10187,13 @@
               <a:p>
                 <a:pPr algn="ctr"/>
                 <a:r>
-                  <a:rPr lang="en-US" b="1" dirty="0" smtClean="0">
+                  <a:rPr lang="en-US" b="1" dirty="0">
                     <a:solidFill>
                       <a:schemeClr val="tx1"/>
                     </a:solidFill>
                   </a:rPr>
                   <a:t>0</a:t>
                 </a:r>
-                <a:endParaRPr lang="en-US" b="1" dirty="0">
-                  <a:solidFill>
-                    <a:schemeClr val="tx1"/>
-                  </a:solidFill>
-                </a:endParaRPr>
               </a:p>
             </p:txBody>
           </p:sp>
@@ -10538,18 +10240,13 @@
               <a:p>
                 <a:pPr algn="ctr"/>
                 <a:r>
-                  <a:rPr lang="en-US" b="1" dirty="0" smtClean="0">
+                  <a:rPr lang="en-US" b="1" dirty="0">
                     <a:solidFill>
                       <a:schemeClr val="tx1"/>
                     </a:solidFill>
                   </a:rPr>
                   <a:t>0</a:t>
                 </a:r>
-                <a:endParaRPr lang="en-US" b="1" dirty="0">
-                  <a:solidFill>
-                    <a:schemeClr val="tx1"/>
-                  </a:solidFill>
-                </a:endParaRPr>
               </a:p>
             </p:txBody>
           </p:sp>
@@ -10596,18 +10293,13 @@
               <a:p>
                 <a:pPr algn="ctr"/>
                 <a:r>
-                  <a:rPr lang="en-US" b="1" dirty="0" smtClean="0">
+                  <a:rPr lang="en-US" b="1" dirty="0">
                     <a:solidFill>
                       <a:schemeClr val="tx1"/>
                     </a:solidFill>
                   </a:rPr>
                   <a:t>0.5</a:t>
                 </a:r>
-                <a:endParaRPr lang="en-US" b="1" dirty="0">
-                  <a:solidFill>
-                    <a:schemeClr val="tx1"/>
-                  </a:solidFill>
-                </a:endParaRPr>
               </a:p>
             </p:txBody>
           </p:sp>
@@ -10636,10 +10328,9 @@
             <a:p>
               <a:pPr algn="ctr"/>
               <a:r>
-                <a:rPr lang="en-US" sz="2400" dirty="0" smtClean="0"/>
+                <a:rPr lang="en-US" sz="2400" dirty="0"/>
                 <a:t>M+0</a:t>
               </a:r>
-              <a:endParaRPr lang="en-US" sz="2400" dirty="0"/>
             </a:p>
           </p:txBody>
         </p:sp>
@@ -10667,10 +10358,9 @@
             <a:p>
               <a:pPr algn="ctr"/>
               <a:r>
-                <a:rPr lang="en-US" sz="2400" dirty="0" smtClean="0"/>
+                <a:rPr lang="en-US" sz="2400" dirty="0"/>
                 <a:t>M+1</a:t>
               </a:r>
-              <a:endParaRPr lang="en-US" sz="2400" dirty="0"/>
             </a:p>
           </p:txBody>
         </p:sp>
@@ -10698,7 +10388,7 @@
             <a:p>
               <a:pPr algn="ctr"/>
               <a:r>
-                <a:rPr lang="en-US" sz="2400" smtClean="0"/>
+                <a:rPr lang="en-US" sz="2400"/>
                 <a:t>M+2</a:t>
               </a:r>
               <a:endParaRPr lang="en-US" sz="2400" dirty="0"/>
@@ -10748,18 +10438,13 @@
             <a:p>
               <a:pPr algn="ctr"/>
               <a:r>
-                <a:rPr lang="en-US" b="1" dirty="0" smtClean="0">
+                <a:rPr lang="en-US" b="1" dirty="0">
                   <a:solidFill>
                     <a:schemeClr val="tx1"/>
                   </a:solidFill>
                 </a:rPr>
                 <a:t>0.5</a:t>
               </a:r>
-              <a:endParaRPr lang="en-US" b="1" dirty="0">
-                <a:solidFill>
-                  <a:schemeClr val="tx1"/>
-                </a:solidFill>
-              </a:endParaRPr>
             </a:p>
           </p:txBody>
         </p:sp>
@@ -10786,11 +10471,11 @@
             <a:lstStyle/>
             <a:p>
               <a:r>
-                <a:rPr lang="en-US" sz="3200" dirty="0" smtClean="0"/>
+                <a:rPr lang="en-US" sz="3200" dirty="0"/>
                 <a:t>C</a:t>
               </a:r>
               <a:r>
-                <a:rPr lang="en-US" sz="3200" baseline="-25000" dirty="0" smtClean="0"/>
+                <a:rPr lang="en-US" sz="3200" baseline="-25000" dirty="0"/>
                 <a:t>1,2,3</a:t>
               </a:r>
               <a:endParaRPr lang="en-US" sz="3200" dirty="0"/>
@@ -10821,7 +10506,7 @@
             <a:p>
               <a:pPr algn="ctr"/>
               <a:r>
-                <a:rPr lang="en-US" sz="2400" smtClean="0"/>
+                <a:rPr lang="en-US" sz="2400"/>
                 <a:t>M+3</a:t>
               </a:r>
               <a:endParaRPr lang="en-US" sz="2400" dirty="0"/>
@@ -10839,13 +10524,6 @@
   <p:clrMapOvr>
     <a:masterClrMapping/>
   </p:clrMapOvr>
-  <p:timing>
-    <p:tnLst>
-      <p:par>
-        <p:cTn id="1" dur="indefinite" restart="never" nodeType="tmRoot"/>
-      </p:par>
-    </p:tnLst>
-  </p:timing>
 </p:sld>
 </file>
 

</xml_diff>